<commit_message>
[Java] Improve the ATJ tutorial.
Spell out the class names, with their 'Acl2' prefix, instead of simplifying the
prefix away as done in the Workshop paper.
</commit_message>
<xml_diff>
--- a/books/kestrel/java/atj/images/value-classes.pptx
+++ b/books/kestrel/java/atj/images/value-classes.pptx
@@ -125,6 +125,9 @@
     <p:ext uri="{EFAFB233-063F-42B5-8137-9DF3F51BA10A}">
       <p15:sldGuideLst xmlns:p15="http://schemas.microsoft.com/office/powerpoint/2012/main"/>
     </p:ext>
+    <p:ext uri="{2D200454-40CA-4A62-9FC3-DE9A4176ACB9}">
+      <p15:notesGuideLst xmlns:p15="http://schemas.microsoft.com/office/powerpoint/2012/main"/>
+    </p:ext>
   </p:extLst>
 </p:presentation>
 </file>
@@ -210,7 +213,7 @@
           </a:lstStyle>
           <a:p>
             <a:fld id="{FBA984DD-C9F9-3049-8A3A-E9E0DCCCEBB1}" type="datetimeFigureOut">
-              <a:t>1/28/20</a:t>
+              <a:t>2/4/20</a:t>
             </a:fld>
             <a:endParaRPr lang="en-US"/>
           </a:p>
@@ -604,7 +607,7 @@
           <a:lstStyle/>
           <a:p>
             <a:fld id="{B6976737-B4AE-8046-B287-15D2357F1C0B}" type="datetimeFigureOut">
-              <a:t>1/28/20</a:t>
+              <a:t>2/4/20</a:t>
             </a:fld>
             <a:endParaRPr lang="en-US"/>
           </a:p>
@@ -770,7 +773,7 @@
           <a:lstStyle/>
           <a:p>
             <a:fld id="{B6976737-B4AE-8046-B287-15D2357F1C0B}" type="datetimeFigureOut">
-              <a:t>1/28/20</a:t>
+              <a:t>2/4/20</a:t>
             </a:fld>
             <a:endParaRPr lang="en-US"/>
           </a:p>
@@ -946,7 +949,7 @@
           <a:lstStyle/>
           <a:p>
             <a:fld id="{B6976737-B4AE-8046-B287-15D2357F1C0B}" type="datetimeFigureOut">
-              <a:t>1/28/20</a:t>
+              <a:t>2/4/20</a:t>
             </a:fld>
             <a:endParaRPr lang="en-US"/>
           </a:p>
@@ -1112,7 +1115,7 @@
           <a:lstStyle/>
           <a:p>
             <a:fld id="{B6976737-B4AE-8046-B287-15D2357F1C0B}" type="datetimeFigureOut">
-              <a:t>1/28/20</a:t>
+              <a:t>2/4/20</a:t>
             </a:fld>
             <a:endParaRPr lang="en-US"/>
           </a:p>
@@ -1353,7 +1356,7 @@
           <a:lstStyle/>
           <a:p>
             <a:fld id="{B6976737-B4AE-8046-B287-15D2357F1C0B}" type="datetimeFigureOut">
-              <a:t>1/28/20</a:t>
+              <a:t>2/4/20</a:t>
             </a:fld>
             <a:endParaRPr lang="en-US"/>
           </a:p>
@@ -1580,7 +1583,7 @@
           <a:lstStyle/>
           <a:p>
             <a:fld id="{B6976737-B4AE-8046-B287-15D2357F1C0B}" type="datetimeFigureOut">
-              <a:t>1/28/20</a:t>
+              <a:t>2/4/20</a:t>
             </a:fld>
             <a:endParaRPr lang="en-US"/>
           </a:p>
@@ -1942,7 +1945,7 @@
           <a:lstStyle/>
           <a:p>
             <a:fld id="{B6976737-B4AE-8046-B287-15D2357F1C0B}" type="datetimeFigureOut">
-              <a:t>1/28/20</a:t>
+              <a:t>2/4/20</a:t>
             </a:fld>
             <a:endParaRPr lang="en-US"/>
           </a:p>
@@ -2057,7 +2060,7 @@
           <a:lstStyle/>
           <a:p>
             <a:fld id="{B6976737-B4AE-8046-B287-15D2357F1C0B}" type="datetimeFigureOut">
-              <a:t>1/28/20</a:t>
+              <a:t>2/4/20</a:t>
             </a:fld>
             <a:endParaRPr lang="en-US"/>
           </a:p>
@@ -2150,7 +2153,7 @@
           <a:lstStyle/>
           <a:p>
             <a:fld id="{B6976737-B4AE-8046-B287-15D2357F1C0B}" type="datetimeFigureOut">
-              <a:t>1/28/20</a:t>
+              <a:t>2/4/20</a:t>
             </a:fld>
             <a:endParaRPr lang="en-US"/>
           </a:p>
@@ -2423,7 +2426,7 @@
           <a:lstStyle/>
           <a:p>
             <a:fld id="{B6976737-B4AE-8046-B287-15D2357F1C0B}" type="datetimeFigureOut">
-              <a:t>1/28/20</a:t>
+              <a:t>2/4/20</a:t>
             </a:fld>
             <a:endParaRPr lang="en-US"/>
           </a:p>
@@ -2676,7 +2679,7 @@
           <a:lstStyle/>
           <a:p>
             <a:fld id="{B6976737-B4AE-8046-B287-15D2357F1C0B}" type="datetimeFigureOut">
-              <a:t>1/28/20</a:t>
+              <a:t>2/4/20</a:t>
             </a:fld>
             <a:endParaRPr lang="en-US"/>
           </a:p>
@@ -2885,7 +2888,7 @@
           </a:lstStyle>
           <a:p>
             <a:fld id="{B6976737-B4AE-8046-B287-15D2357F1C0B}" type="datetimeFigureOut">
-              <a:t>1/28/20</a:t>
+              <a:t>2/4/20</a:t>
             </a:fld>
             <a:endParaRPr lang="en-US"/>
           </a:p>
@@ -3289,1009 +3292,905 @@
           <a:chExt cx="0" cy="0"/>
         </a:xfrm>
       </p:grpSpPr>
-      <p:grpSp>
-        <p:nvGrpSpPr>
-          <p:cNvPr id="88" name="Group 87">
+      <p:cxnSp>
+        <p:nvCxnSpPr>
+          <p:cNvPr id="77" name="Straight Connector 76">
             <a:extLst>
               <a:ext uri="{FF2B5EF4-FFF2-40B4-BE49-F238E27FC236}">
-                <a16:creationId xmlns:a16="http://schemas.microsoft.com/office/drawing/2014/main" id="{5ADAB246-EE43-464F-BA5E-FE4E59B5FA63}"/>
+                <a16:creationId xmlns:a16="http://schemas.microsoft.com/office/drawing/2014/main" id="{02F5447E-8864-E643-AC81-64F576D2BF22}"/>
               </a:ext>
             </a:extLst>
           </p:cNvPr>
-          <p:cNvGrpSpPr/>
+          <p:cNvCxnSpPr>
+            <a:cxnSpLocks/>
+          </p:cNvCxnSpPr>
           <p:nvPr/>
-        </p:nvGrpSpPr>
-        <p:grpSpPr>
-          <a:xfrm>
-            <a:off x="5176024" y="1732395"/>
-            <a:ext cx="3457599" cy="183610"/>
-            <a:chOff x="5130924" y="1732395"/>
-            <a:chExt cx="3457599" cy="183610"/>
-          </a:xfrm>
-        </p:grpSpPr>
-        <p:cxnSp>
-          <p:nvCxnSpPr>
-            <p:cNvPr id="77" name="Straight Connector 76">
-              <a:extLst>
-                <a:ext uri="{FF2B5EF4-FFF2-40B4-BE49-F238E27FC236}">
-                  <a16:creationId xmlns:a16="http://schemas.microsoft.com/office/drawing/2014/main" id="{02F5447E-8864-E643-AC81-64F576D2BF22}"/>
-                </a:ext>
-              </a:extLst>
-            </p:cNvPr>
-            <p:cNvCxnSpPr>
-              <a:cxnSpLocks/>
-            </p:cNvCxnSpPr>
-            <p:nvPr/>
-          </p:nvCxnSpPr>
-          <p:spPr>
-            <a:xfrm>
-              <a:off x="5130924" y="1732395"/>
-              <a:ext cx="3457599" cy="0"/>
-            </a:xfrm>
-            <a:prstGeom prst="line">
-              <a:avLst/>
-            </a:prstGeom>
-            <a:ln w="12700">
-              <a:solidFill>
-                <a:schemeClr val="tx1"/>
-              </a:solidFill>
-            </a:ln>
-          </p:spPr>
-          <p:style>
-            <a:lnRef idx="1">
-              <a:schemeClr val="accent1"/>
-            </a:lnRef>
-            <a:fillRef idx="0">
-              <a:schemeClr val="accent1"/>
-            </a:fillRef>
-            <a:effectRef idx="0">
-              <a:schemeClr val="accent1"/>
-            </a:effectRef>
-            <a:fontRef idx="minor">
+        </p:nvCxnSpPr>
+        <p:spPr>
+          <a:xfrm>
+            <a:off x="5510600" y="1732395"/>
+            <a:ext cx="3183085" cy="0"/>
+          </a:xfrm>
+          <a:prstGeom prst="line">
+            <a:avLst/>
+          </a:prstGeom>
+          <a:ln w="12700">
+            <a:solidFill>
               <a:schemeClr val="tx1"/>
-            </a:fontRef>
-          </p:style>
-        </p:cxnSp>
-        <p:cxnSp>
-          <p:nvCxnSpPr>
-            <p:cNvPr id="78" name="Straight Connector 77">
-              <a:extLst>
-                <a:ext uri="{FF2B5EF4-FFF2-40B4-BE49-F238E27FC236}">
-                  <a16:creationId xmlns:a16="http://schemas.microsoft.com/office/drawing/2014/main" id="{4CF9F4C7-CDE7-A240-B36E-EDA63E4BC1BD}"/>
-                </a:ext>
-              </a:extLst>
-            </p:cNvPr>
-            <p:cNvCxnSpPr>
-              <a:cxnSpLocks/>
-            </p:cNvCxnSpPr>
-            <p:nvPr/>
-          </p:nvCxnSpPr>
-          <p:spPr>
-            <a:xfrm>
-              <a:off x="5133436" y="1916005"/>
-              <a:ext cx="3299364" cy="0"/>
-            </a:xfrm>
-            <a:prstGeom prst="line">
-              <a:avLst/>
-            </a:prstGeom>
-            <a:ln w="12700">
-              <a:solidFill>
-                <a:schemeClr val="tx1"/>
-              </a:solidFill>
-            </a:ln>
-          </p:spPr>
-          <p:style>
-            <a:lnRef idx="1">
-              <a:schemeClr val="accent1"/>
-            </a:lnRef>
-            <a:fillRef idx="0">
-              <a:schemeClr val="accent1"/>
-            </a:fillRef>
-            <a:effectRef idx="0">
-              <a:schemeClr val="accent1"/>
-            </a:effectRef>
-            <a:fontRef idx="minor">
-              <a:schemeClr val="tx1"/>
-            </a:fontRef>
-          </p:style>
-        </p:cxnSp>
-      </p:grpSp>
-      <p:grpSp>
-        <p:nvGrpSpPr>
-          <p:cNvPr id="87" name="Group 86">
+            </a:solidFill>
+          </a:ln>
+        </p:spPr>
+        <p:style>
+          <a:lnRef idx="1">
+            <a:schemeClr val="accent1"/>
+          </a:lnRef>
+          <a:fillRef idx="0">
+            <a:schemeClr val="accent1"/>
+          </a:fillRef>
+          <a:effectRef idx="0">
+            <a:schemeClr val="accent1"/>
+          </a:effectRef>
+          <a:fontRef idx="minor">
+            <a:schemeClr val="tx1"/>
+          </a:fontRef>
+        </p:style>
+      </p:cxnSp>
+      <p:cxnSp>
+        <p:nvCxnSpPr>
+          <p:cNvPr id="78" name="Straight Connector 77">
             <a:extLst>
               <a:ext uri="{FF2B5EF4-FFF2-40B4-BE49-F238E27FC236}">
-                <a16:creationId xmlns:a16="http://schemas.microsoft.com/office/drawing/2014/main" id="{7E72FADD-82F8-EA49-A999-908DECED07E9}"/>
+                <a16:creationId xmlns:a16="http://schemas.microsoft.com/office/drawing/2014/main" id="{4CF9F4C7-CDE7-A240-B36E-EDA63E4BC1BD}"/>
               </a:ext>
             </a:extLst>
           </p:cNvPr>
-          <p:cNvGrpSpPr/>
+          <p:cNvCxnSpPr>
+            <a:cxnSpLocks/>
+          </p:cNvCxnSpPr>
           <p:nvPr/>
-        </p:nvGrpSpPr>
-        <p:grpSpPr>
-          <a:xfrm>
-            <a:off x="8009231" y="1732395"/>
-            <a:ext cx="1124307" cy="1154606"/>
-            <a:chOff x="7964131" y="1732395"/>
-            <a:chExt cx="1124307" cy="1154606"/>
-          </a:xfrm>
-        </p:grpSpPr>
-        <p:sp>
-          <p:nvSpPr>
-            <p:cNvPr id="76" name="TextBox 75">
-              <a:extLst>
-                <a:ext uri="{FF2B5EF4-FFF2-40B4-BE49-F238E27FC236}">
-                  <a16:creationId xmlns:a16="http://schemas.microsoft.com/office/drawing/2014/main" id="{A4755848-2DB6-BE4C-A4AD-E9E04E7BB5EF}"/>
-                </a:ext>
-              </a:extLst>
-            </p:cNvPr>
-            <p:cNvSpPr txBox="1"/>
-            <p:nvPr/>
-          </p:nvSpPr>
-          <p:spPr>
-            <a:xfrm>
-              <a:off x="7964131" y="1862271"/>
-              <a:ext cx="504754" cy="400110"/>
-            </a:xfrm>
-            <a:prstGeom prst="rect">
-              <a:avLst/>
-            </a:prstGeom>
-            <a:noFill/>
-          </p:spPr>
-          <p:txBody>
-            <a:bodyPr wrap="none" rtlCol="0">
-              <a:spAutoFit/>
-            </a:bodyPr>
-            <a:lstStyle/>
-            <a:p>
-              <a:r>
-                <a:rPr lang="en-US" sz="2000">
-                  <a:cs typeface="Arial Narrow" panose="020B0604020202020204" pitchFamily="34" charset="0"/>
-                </a:rPr>
-                <a:t>car</a:t>
-              </a:r>
-            </a:p>
-          </p:txBody>
-        </p:sp>
-        <p:sp>
-          <p:nvSpPr>
-            <p:cNvPr id="79" name="TextBox 78">
-              <a:extLst>
-                <a:ext uri="{FF2B5EF4-FFF2-40B4-BE49-F238E27FC236}">
-                  <a16:creationId xmlns:a16="http://schemas.microsoft.com/office/drawing/2014/main" id="{5E7670F5-C7C1-3045-BA2C-21A74CD40980}"/>
-                </a:ext>
-              </a:extLst>
-            </p:cNvPr>
-            <p:cNvSpPr txBox="1"/>
-            <p:nvPr/>
-          </p:nvSpPr>
-          <p:spPr>
-            <a:xfrm>
-              <a:off x="8570347" y="1866488"/>
-              <a:ext cx="518091" cy="400110"/>
-            </a:xfrm>
-            <a:prstGeom prst="rect">
-              <a:avLst/>
-            </a:prstGeom>
-            <a:noFill/>
-          </p:spPr>
-          <p:txBody>
-            <a:bodyPr wrap="none" rtlCol="0">
-              <a:spAutoFit/>
-            </a:bodyPr>
-            <a:lstStyle/>
-            <a:p>
-              <a:r>
-                <a:rPr lang="en-US" sz="2000">
-                  <a:cs typeface="Arial Narrow" panose="020B0604020202020204" pitchFamily="34" charset="0"/>
-                </a:rPr>
-                <a:t>cdr</a:t>
-              </a:r>
-            </a:p>
-          </p:txBody>
-        </p:sp>
-        <p:cxnSp>
-          <p:nvCxnSpPr>
-            <p:cNvPr id="80" name="Straight Connector 79">
-              <a:extLst>
-                <a:ext uri="{FF2B5EF4-FFF2-40B4-BE49-F238E27FC236}">
-                  <a16:creationId xmlns:a16="http://schemas.microsoft.com/office/drawing/2014/main" id="{9FE41979-30F1-1F44-81EA-400DE39DB197}"/>
-                </a:ext>
-              </a:extLst>
-            </p:cNvPr>
-            <p:cNvCxnSpPr>
-              <a:cxnSpLocks/>
-              <a:endCxn id="82" idx="3"/>
-            </p:cNvCxnSpPr>
-            <p:nvPr/>
-          </p:nvCxnSpPr>
-          <p:spPr>
-            <a:xfrm>
-              <a:off x="8436392" y="1916005"/>
-              <a:ext cx="0" cy="786776"/>
-            </a:xfrm>
-            <a:prstGeom prst="line">
-              <a:avLst/>
-            </a:prstGeom>
-            <a:ln w="12700">
-              <a:solidFill>
-                <a:schemeClr val="tx1"/>
-              </a:solidFill>
-            </a:ln>
-          </p:spPr>
-          <p:style>
-            <a:lnRef idx="1">
-              <a:schemeClr val="accent1"/>
-            </a:lnRef>
-            <a:fillRef idx="0">
-              <a:schemeClr val="accent1"/>
-            </a:fillRef>
-            <a:effectRef idx="0">
-              <a:schemeClr val="accent1"/>
-            </a:effectRef>
-            <a:fontRef idx="minor">
-              <a:schemeClr val="tx1"/>
-            </a:fontRef>
-          </p:style>
-        </p:cxnSp>
-        <p:cxnSp>
-          <p:nvCxnSpPr>
-            <p:cNvPr id="81" name="Straight Connector 80">
-              <a:extLst>
-                <a:ext uri="{FF2B5EF4-FFF2-40B4-BE49-F238E27FC236}">
-                  <a16:creationId xmlns:a16="http://schemas.microsoft.com/office/drawing/2014/main" id="{D2558925-B5C7-384C-ABEF-F8DB8731A60B}"/>
-                </a:ext>
-              </a:extLst>
-            </p:cNvPr>
-            <p:cNvCxnSpPr>
-              <a:cxnSpLocks/>
-            </p:cNvCxnSpPr>
-            <p:nvPr/>
-          </p:nvCxnSpPr>
-          <p:spPr>
-            <a:xfrm>
-              <a:off x="8587085" y="1732395"/>
-              <a:ext cx="0" cy="970386"/>
-            </a:xfrm>
-            <a:prstGeom prst="line">
-              <a:avLst/>
-            </a:prstGeom>
-            <a:ln w="12700">
-              <a:solidFill>
-                <a:schemeClr val="tx1"/>
-              </a:solidFill>
-            </a:ln>
-          </p:spPr>
-          <p:style>
-            <a:lnRef idx="1">
-              <a:schemeClr val="accent1"/>
-            </a:lnRef>
-            <a:fillRef idx="0">
-              <a:schemeClr val="accent1"/>
-            </a:fillRef>
-            <a:effectRef idx="0">
-              <a:schemeClr val="accent1"/>
-            </a:effectRef>
-            <a:fontRef idx="minor">
-              <a:schemeClr val="tx1"/>
-            </a:fontRef>
-          </p:style>
-        </p:cxnSp>
-        <p:sp>
-          <p:nvSpPr>
-            <p:cNvPr id="82" name="Diamond 81">
-              <a:extLst>
-                <a:ext uri="{FF2B5EF4-FFF2-40B4-BE49-F238E27FC236}">
-                  <a16:creationId xmlns:a16="http://schemas.microsoft.com/office/drawing/2014/main" id="{56F30782-DCFC-9446-9F28-C1876E7FD181}"/>
-                </a:ext>
-              </a:extLst>
-            </p:cNvPr>
-            <p:cNvSpPr/>
-            <p:nvPr/>
-          </p:nvSpPr>
-          <p:spPr>
-            <a:xfrm rot="16200000">
-              <a:off x="8344281" y="2733701"/>
-              <a:ext cx="184221" cy="122380"/>
-            </a:xfrm>
-            <a:prstGeom prst="diamond">
-              <a:avLst/>
-            </a:prstGeom>
+        </p:nvCxnSpPr>
+        <p:spPr>
+          <a:xfrm>
+            <a:off x="5510600" y="1916005"/>
+            <a:ext cx="3029742" cy="0"/>
+          </a:xfrm>
+          <a:prstGeom prst="line">
+            <a:avLst/>
+          </a:prstGeom>
+          <a:ln w="12700">
             <a:solidFill>
               <a:schemeClr val="tx1"/>
             </a:solidFill>
-            <a:ln w="6350">
-              <a:solidFill>
-                <a:schemeClr val="tx1"/>
-              </a:solidFill>
-            </a:ln>
-          </p:spPr>
-          <p:style>
-            <a:lnRef idx="2">
-              <a:schemeClr val="accent1">
-                <a:shade val="50000"/>
-              </a:schemeClr>
-            </a:lnRef>
-            <a:fillRef idx="1">
-              <a:schemeClr val="accent1"/>
-            </a:fillRef>
-            <a:effectRef idx="0">
-              <a:schemeClr val="accent1"/>
-            </a:effectRef>
-            <a:fontRef idx="minor">
-              <a:schemeClr val="lt1"/>
-            </a:fontRef>
-          </p:style>
-          <p:txBody>
-            <a:bodyPr rtlCol="0" anchor="ctr"/>
-            <a:lstStyle/>
-            <a:p>
-              <a:pPr algn="ctr"/>
-              <a:endParaRPr lang="en-US" sz="2000"/>
-            </a:p>
-          </p:txBody>
-        </p:sp>
-        <p:sp>
-          <p:nvSpPr>
-            <p:cNvPr id="83" name="Diamond 82">
-              <a:extLst>
-                <a:ext uri="{FF2B5EF4-FFF2-40B4-BE49-F238E27FC236}">
-                  <a16:creationId xmlns:a16="http://schemas.microsoft.com/office/drawing/2014/main" id="{D29CEE02-70C3-5341-9592-CA946C667C47}"/>
-                </a:ext>
-              </a:extLst>
-            </p:cNvPr>
-            <p:cNvSpPr/>
-            <p:nvPr/>
-          </p:nvSpPr>
-          <p:spPr>
-            <a:xfrm rot="16200000">
-              <a:off x="8498753" y="2733701"/>
-              <a:ext cx="184221" cy="122380"/>
-            </a:xfrm>
-            <a:prstGeom prst="diamond">
-              <a:avLst/>
-            </a:prstGeom>
+          </a:ln>
+        </p:spPr>
+        <p:style>
+          <a:lnRef idx="1">
+            <a:schemeClr val="accent1"/>
+          </a:lnRef>
+          <a:fillRef idx="0">
+            <a:schemeClr val="accent1"/>
+          </a:fillRef>
+          <a:effectRef idx="0">
+            <a:schemeClr val="accent1"/>
+          </a:effectRef>
+          <a:fontRef idx="minor">
+            <a:schemeClr val="tx1"/>
+          </a:fontRef>
+        </p:style>
+      </p:cxnSp>
+      <p:sp>
+        <p:nvSpPr>
+          <p:cNvPr id="76" name="TextBox 75">
+            <a:extLst>
+              <a:ext uri="{FF2B5EF4-FFF2-40B4-BE49-F238E27FC236}">
+                <a16:creationId xmlns:a16="http://schemas.microsoft.com/office/drawing/2014/main" id="{A4755848-2DB6-BE4C-A4AD-E9E04E7BB5EF}"/>
+              </a:ext>
+            </a:extLst>
+          </p:cNvPr>
+          <p:cNvSpPr txBox="1"/>
+          <p:nvPr/>
+        </p:nvSpPr>
+        <p:spPr>
+          <a:xfrm>
+            <a:off x="8156832" y="1862271"/>
+            <a:ext cx="407612" cy="307777"/>
+          </a:xfrm>
+          <a:prstGeom prst="rect">
+            <a:avLst/>
+          </a:prstGeom>
+          <a:noFill/>
+        </p:spPr>
+        <p:txBody>
+          <a:bodyPr wrap="none" rtlCol="0">
+            <a:spAutoFit/>
+          </a:bodyPr>
+          <a:lstStyle/>
+          <a:p>
+            <a:r>
+              <a:rPr lang="en-US" sz="1400">
+                <a:cs typeface="Arial Narrow" panose="020B0604020202020204" pitchFamily="34" charset="0"/>
+              </a:rPr>
+              <a:t>car</a:t>
+            </a:r>
+          </a:p>
+        </p:txBody>
+      </p:sp>
+      <p:sp>
+        <p:nvSpPr>
+          <p:cNvPr id="79" name="TextBox 78">
+            <a:extLst>
+              <a:ext uri="{FF2B5EF4-FFF2-40B4-BE49-F238E27FC236}">
+                <a16:creationId xmlns:a16="http://schemas.microsoft.com/office/drawing/2014/main" id="{5E7670F5-C7C1-3045-BA2C-21A74CD40980}"/>
+              </a:ext>
+            </a:extLst>
+          </p:cNvPr>
+          <p:cNvSpPr txBox="1"/>
+          <p:nvPr/>
+        </p:nvSpPr>
+        <p:spPr>
+          <a:xfrm>
+            <a:off x="8676947" y="1866488"/>
+            <a:ext cx="417102" cy="307777"/>
+          </a:xfrm>
+          <a:prstGeom prst="rect">
+            <a:avLst/>
+          </a:prstGeom>
+          <a:noFill/>
+        </p:spPr>
+        <p:txBody>
+          <a:bodyPr wrap="none" rtlCol="0">
+            <a:spAutoFit/>
+          </a:bodyPr>
+          <a:lstStyle/>
+          <a:p>
+            <a:r>
+              <a:rPr lang="en-US" sz="1400">
+                <a:cs typeface="Arial Narrow" panose="020B0604020202020204" pitchFamily="34" charset="0"/>
+              </a:rPr>
+              <a:t>cdr</a:t>
+            </a:r>
+          </a:p>
+        </p:txBody>
+      </p:sp>
+      <p:cxnSp>
+        <p:nvCxnSpPr>
+          <p:cNvPr id="80" name="Straight Connector 79">
+            <a:extLst>
+              <a:ext uri="{FF2B5EF4-FFF2-40B4-BE49-F238E27FC236}">
+                <a16:creationId xmlns:a16="http://schemas.microsoft.com/office/drawing/2014/main" id="{9FE41979-30F1-1F44-81EA-400DE39DB197}"/>
+              </a:ext>
+            </a:extLst>
+          </p:cNvPr>
+          <p:cNvCxnSpPr>
+            <a:cxnSpLocks/>
+            <a:endCxn id="82" idx="3"/>
+          </p:cNvCxnSpPr>
+          <p:nvPr/>
+        </p:nvCxnSpPr>
+        <p:spPr>
+          <a:xfrm>
+            <a:off x="8540342" y="1916005"/>
+            <a:ext cx="0" cy="813891"/>
+          </a:xfrm>
+          <a:prstGeom prst="line">
+            <a:avLst/>
+          </a:prstGeom>
+          <a:ln w="12700">
             <a:solidFill>
               <a:schemeClr val="tx1"/>
             </a:solidFill>
-            <a:ln w="6350">
-              <a:solidFill>
-                <a:schemeClr val="tx1"/>
-              </a:solidFill>
-            </a:ln>
-          </p:spPr>
-          <p:style>
-            <a:lnRef idx="2">
-              <a:schemeClr val="accent1">
-                <a:shade val="50000"/>
-              </a:schemeClr>
-            </a:lnRef>
-            <a:fillRef idx="1">
-              <a:schemeClr val="accent1"/>
-            </a:fillRef>
-            <a:effectRef idx="0">
-              <a:schemeClr val="accent1"/>
-            </a:effectRef>
-            <a:fontRef idx="minor">
-              <a:schemeClr val="lt1"/>
-            </a:fontRef>
-          </p:style>
-          <p:txBody>
-            <a:bodyPr rtlCol="0" anchor="ctr"/>
-            <a:lstStyle/>
-            <a:p>
-              <a:pPr algn="ctr"/>
-              <a:endParaRPr lang="en-US" sz="2000"/>
-            </a:p>
-          </p:txBody>
-        </p:sp>
-      </p:grpSp>
-      <p:grpSp>
-        <p:nvGrpSpPr>
-          <p:cNvPr id="75" name="Group 74">
+          </a:ln>
+        </p:spPr>
+        <p:style>
+          <a:lnRef idx="1">
+            <a:schemeClr val="accent1"/>
+          </a:lnRef>
+          <a:fillRef idx="0">
+            <a:schemeClr val="accent1"/>
+          </a:fillRef>
+          <a:effectRef idx="0">
+            <a:schemeClr val="accent1"/>
+          </a:effectRef>
+          <a:fontRef idx="minor">
+            <a:schemeClr val="tx1"/>
+          </a:fontRef>
+        </p:style>
+      </p:cxnSp>
+      <p:cxnSp>
+        <p:nvCxnSpPr>
+          <p:cNvPr id="81" name="Straight Connector 80">
             <a:extLst>
               <a:ext uri="{FF2B5EF4-FFF2-40B4-BE49-F238E27FC236}">
-                <a16:creationId xmlns:a16="http://schemas.microsoft.com/office/drawing/2014/main" id="{E6F891F3-69C5-8A4F-AFD9-6557E4FC1703}"/>
+                <a16:creationId xmlns:a16="http://schemas.microsoft.com/office/drawing/2014/main" id="{D2558925-B5C7-384C-ABEF-F8DB8731A60B}"/>
               </a:ext>
             </a:extLst>
           </p:cNvPr>
-          <p:cNvGrpSpPr/>
+          <p:cNvCxnSpPr>
+            <a:cxnSpLocks/>
+            <a:endCxn id="83" idx="3"/>
+          </p:cNvCxnSpPr>
           <p:nvPr/>
-        </p:nvGrpSpPr>
-        <p:grpSpPr>
-          <a:xfrm>
-            <a:off x="7149200" y="3290499"/>
-            <a:ext cx="1685802" cy="841772"/>
-            <a:chOff x="7008980" y="3286720"/>
-            <a:chExt cx="1685802" cy="841772"/>
-          </a:xfrm>
-        </p:grpSpPr>
-        <p:cxnSp>
-          <p:nvCxnSpPr>
-            <p:cNvPr id="71" name="Straight Connector 70">
-              <a:extLst>
-                <a:ext uri="{FF2B5EF4-FFF2-40B4-BE49-F238E27FC236}">
-                  <a16:creationId xmlns:a16="http://schemas.microsoft.com/office/drawing/2014/main" id="{F008CE88-AC2F-DF42-9552-CB8B88EFC569}"/>
-                </a:ext>
-              </a:extLst>
-            </p:cNvPr>
-            <p:cNvCxnSpPr>
-              <a:cxnSpLocks/>
-              <a:stCxn id="74" idx="1"/>
-              <a:endCxn id="72" idx="0"/>
-            </p:cNvCxnSpPr>
-            <p:nvPr/>
-          </p:nvCxnSpPr>
-          <p:spPr>
-            <a:xfrm>
-              <a:off x="7070170" y="3470942"/>
-              <a:ext cx="0" cy="657550"/>
-            </a:xfrm>
-            <a:prstGeom prst="line">
-              <a:avLst/>
-            </a:prstGeom>
-            <a:ln w="12700">
-              <a:solidFill>
-                <a:schemeClr val="tx1"/>
-              </a:solidFill>
-            </a:ln>
-          </p:spPr>
-          <p:style>
-            <a:lnRef idx="1">
-              <a:schemeClr val="accent1"/>
-            </a:lnRef>
-            <a:fillRef idx="0">
-              <a:schemeClr val="accent1"/>
-            </a:fillRef>
-            <a:effectRef idx="0">
-              <a:schemeClr val="accent1"/>
-            </a:effectRef>
-            <a:fontRef idx="minor">
-              <a:schemeClr val="tx1"/>
-            </a:fontRef>
-          </p:style>
-        </p:cxnSp>
-        <p:sp>
-          <p:nvSpPr>
-            <p:cNvPr id="73" name="TextBox 72">
-              <a:extLst>
-                <a:ext uri="{FF2B5EF4-FFF2-40B4-BE49-F238E27FC236}">
-                  <a16:creationId xmlns:a16="http://schemas.microsoft.com/office/drawing/2014/main" id="{7A6870B8-8AE4-4D43-87B3-DFC73BC5A23B}"/>
-                </a:ext>
-              </a:extLst>
-            </p:cNvPr>
-            <p:cNvSpPr txBox="1"/>
-            <p:nvPr/>
-          </p:nvSpPr>
-          <p:spPr>
-            <a:xfrm>
-              <a:off x="7038623" y="3433802"/>
-              <a:ext cx="1656159" cy="400110"/>
-            </a:xfrm>
-            <a:prstGeom prst="rect">
-              <a:avLst/>
-            </a:prstGeom>
-            <a:noFill/>
-          </p:spPr>
-          <p:txBody>
-            <a:bodyPr wrap="none" rtlCol="0">
-              <a:spAutoFit/>
-            </a:bodyPr>
-            <a:lstStyle/>
-            <a:p>
-              <a:r>
-                <a:rPr lang="en-US" sz="2000">
-                  <a:cs typeface="Arial Narrow" panose="020B0604020202020204" pitchFamily="34" charset="0"/>
-                </a:rPr>
-                <a:t>packageName</a:t>
-              </a:r>
-            </a:p>
-          </p:txBody>
-        </p:sp>
-        <p:sp>
-          <p:nvSpPr>
-            <p:cNvPr id="74" name="Diamond 73">
-              <a:extLst>
-                <a:ext uri="{FF2B5EF4-FFF2-40B4-BE49-F238E27FC236}">
-                  <a16:creationId xmlns:a16="http://schemas.microsoft.com/office/drawing/2014/main" id="{A0FDD640-E870-1E4F-9D46-6592D4224F80}"/>
-                </a:ext>
-              </a:extLst>
-            </p:cNvPr>
-            <p:cNvSpPr/>
-            <p:nvPr/>
-          </p:nvSpPr>
-          <p:spPr>
-            <a:xfrm rot="16200000">
-              <a:off x="6978059" y="3317641"/>
-              <a:ext cx="184221" cy="122380"/>
-            </a:xfrm>
-            <a:prstGeom prst="diamond">
-              <a:avLst/>
-            </a:prstGeom>
+        </p:nvCxnSpPr>
+        <p:spPr>
+          <a:xfrm>
+            <a:off x="8693685" y="1732395"/>
+            <a:ext cx="1129" cy="997501"/>
+          </a:xfrm>
+          <a:prstGeom prst="line">
+            <a:avLst/>
+          </a:prstGeom>
+          <a:ln w="12700">
             <a:solidFill>
               <a:schemeClr val="tx1"/>
             </a:solidFill>
-            <a:ln w="6350">
-              <a:solidFill>
-                <a:schemeClr val="tx1"/>
-              </a:solidFill>
-            </a:ln>
-          </p:spPr>
-          <p:style>
-            <a:lnRef idx="2">
-              <a:schemeClr val="accent1">
-                <a:shade val="50000"/>
-              </a:schemeClr>
-            </a:lnRef>
-            <a:fillRef idx="1">
-              <a:schemeClr val="accent1"/>
-            </a:fillRef>
-            <a:effectRef idx="0">
-              <a:schemeClr val="accent1"/>
-            </a:effectRef>
-            <a:fontRef idx="minor">
-              <a:schemeClr val="lt1"/>
-            </a:fontRef>
-          </p:style>
-          <p:txBody>
-            <a:bodyPr rtlCol="0" anchor="ctr"/>
-            <a:lstStyle/>
-            <a:p>
-              <a:pPr algn="ctr"/>
-              <a:endParaRPr lang="en-US" sz="2000"/>
-            </a:p>
-          </p:txBody>
-        </p:sp>
-      </p:grpSp>
-      <p:grpSp>
-        <p:nvGrpSpPr>
-          <p:cNvPr id="70" name="Group 69">
+          </a:ln>
+        </p:spPr>
+        <p:style>
+          <a:lnRef idx="1">
+            <a:schemeClr val="accent1"/>
+          </a:lnRef>
+          <a:fillRef idx="0">
+            <a:schemeClr val="accent1"/>
+          </a:fillRef>
+          <a:effectRef idx="0">
+            <a:schemeClr val="accent1"/>
+          </a:effectRef>
+          <a:fontRef idx="minor">
+            <a:schemeClr val="tx1"/>
+          </a:fontRef>
+        </p:style>
+      </p:cxnSp>
+      <p:sp>
+        <p:nvSpPr>
+          <p:cNvPr id="82" name="Diamond 81">
             <a:extLst>
               <a:ext uri="{FF2B5EF4-FFF2-40B4-BE49-F238E27FC236}">
-                <a16:creationId xmlns:a16="http://schemas.microsoft.com/office/drawing/2014/main" id="{25165F47-BE9B-BA47-BA83-24B771C80BC8}"/>
+                <a16:creationId xmlns:a16="http://schemas.microsoft.com/office/drawing/2014/main" id="{56F30782-DCFC-9446-9F28-C1876E7FD181}"/>
               </a:ext>
             </a:extLst>
           </p:cNvPr>
-          <p:cNvGrpSpPr/>
+          <p:cNvSpPr/>
           <p:nvPr/>
-        </p:nvGrpSpPr>
-        <p:grpSpPr>
-          <a:xfrm>
-            <a:off x="5450580" y="2759818"/>
-            <a:ext cx="1163641" cy="400110"/>
-            <a:chOff x="5405480" y="2759818"/>
-            <a:chExt cx="1163641" cy="400110"/>
-          </a:xfrm>
-        </p:grpSpPr>
-        <p:cxnSp>
-          <p:nvCxnSpPr>
-            <p:cNvPr id="67" name="Straight Connector 66">
-              <a:extLst>
-                <a:ext uri="{FF2B5EF4-FFF2-40B4-BE49-F238E27FC236}">
-                  <a16:creationId xmlns:a16="http://schemas.microsoft.com/office/drawing/2014/main" id="{7603C0CC-3097-544B-9CAE-19FF6AFBF8E6}"/>
-                </a:ext>
-              </a:extLst>
-            </p:cNvPr>
-            <p:cNvCxnSpPr>
-              <a:cxnSpLocks/>
-              <a:endCxn id="68" idx="1"/>
-            </p:cNvCxnSpPr>
-            <p:nvPr/>
-          </p:nvCxnSpPr>
-          <p:spPr>
-            <a:xfrm>
-              <a:off x="5405480" y="3088870"/>
-              <a:ext cx="979420" cy="6210"/>
-            </a:xfrm>
-            <a:prstGeom prst="line">
-              <a:avLst/>
-            </a:prstGeom>
-            <a:ln w="12700">
-              <a:solidFill>
-                <a:schemeClr val="tx1"/>
-              </a:solidFill>
-            </a:ln>
-          </p:spPr>
-          <p:style>
-            <a:lnRef idx="1">
-              <a:schemeClr val="accent1"/>
-            </a:lnRef>
-            <a:fillRef idx="0">
-              <a:schemeClr val="accent1"/>
-            </a:fillRef>
-            <a:effectRef idx="0">
-              <a:schemeClr val="accent1"/>
-            </a:effectRef>
-            <a:fontRef idx="minor">
-              <a:schemeClr val="tx1"/>
-            </a:fontRef>
-          </p:style>
-        </p:cxnSp>
-        <p:sp>
-          <p:nvSpPr>
-            <p:cNvPr id="68" name="Diamond 67">
-              <a:extLst>
-                <a:ext uri="{FF2B5EF4-FFF2-40B4-BE49-F238E27FC236}">
-                  <a16:creationId xmlns:a16="http://schemas.microsoft.com/office/drawing/2014/main" id="{5A5DC852-595B-494F-81C8-438225BCFBEC}"/>
-                </a:ext>
-              </a:extLst>
-            </p:cNvPr>
-            <p:cNvSpPr/>
-            <p:nvPr/>
-          </p:nvSpPr>
-          <p:spPr>
-            <a:xfrm>
-              <a:off x="6384900" y="3033890"/>
-              <a:ext cx="184221" cy="122380"/>
-            </a:xfrm>
-            <a:prstGeom prst="diamond">
-              <a:avLst/>
-            </a:prstGeom>
+        </p:nvSpPr>
+        <p:spPr>
+          <a:xfrm rot="16200000">
+            <a:off x="8448231" y="2760816"/>
+            <a:ext cx="184221" cy="122380"/>
+          </a:xfrm>
+          <a:prstGeom prst="diamond">
+            <a:avLst/>
+          </a:prstGeom>
+          <a:solidFill>
+            <a:schemeClr val="tx1"/>
+          </a:solidFill>
+          <a:ln w="6350">
             <a:solidFill>
               <a:schemeClr val="tx1"/>
             </a:solidFill>
-            <a:ln w="6350">
-              <a:solidFill>
-                <a:schemeClr val="tx1"/>
-              </a:solidFill>
-            </a:ln>
-          </p:spPr>
-          <p:style>
-            <a:lnRef idx="2">
-              <a:schemeClr val="accent1">
-                <a:shade val="50000"/>
-              </a:schemeClr>
-            </a:lnRef>
-            <a:fillRef idx="1">
-              <a:schemeClr val="accent1"/>
-            </a:fillRef>
-            <a:effectRef idx="0">
-              <a:schemeClr val="accent1"/>
-            </a:effectRef>
-            <a:fontRef idx="minor">
-              <a:schemeClr val="lt1"/>
-            </a:fontRef>
-          </p:style>
-          <p:txBody>
-            <a:bodyPr rtlCol="0" anchor="ctr"/>
-            <a:lstStyle/>
-            <a:p>
-              <a:pPr algn="ctr"/>
-              <a:endParaRPr lang="en-US" sz="2000"/>
-            </a:p>
-          </p:txBody>
-        </p:sp>
-        <p:sp>
-          <p:nvSpPr>
-            <p:cNvPr id="69" name="TextBox 68">
-              <a:extLst>
-                <a:ext uri="{FF2B5EF4-FFF2-40B4-BE49-F238E27FC236}">
-                  <a16:creationId xmlns:a16="http://schemas.microsoft.com/office/drawing/2014/main" id="{0D1272CD-FB93-1540-8B4E-0314A8A75325}"/>
-                </a:ext>
-              </a:extLst>
-            </p:cNvPr>
-            <p:cNvSpPr txBox="1"/>
-            <p:nvPr/>
-          </p:nvSpPr>
-          <p:spPr>
-            <a:xfrm>
-              <a:off x="5690168" y="2759818"/>
-              <a:ext cx="776175" cy="400110"/>
-            </a:xfrm>
-            <a:prstGeom prst="rect">
-              <a:avLst/>
-            </a:prstGeom>
-            <a:noFill/>
-          </p:spPr>
-          <p:txBody>
-            <a:bodyPr wrap="none" rtlCol="0">
-              <a:spAutoFit/>
-            </a:bodyPr>
-            <a:lstStyle/>
-            <a:p>
-              <a:r>
-                <a:rPr lang="en-US" sz="2000">
-                  <a:cs typeface="Arial Narrow" panose="020B0604020202020204" pitchFamily="34" charset="0"/>
-                </a:rPr>
-                <a:t>name</a:t>
-              </a:r>
-            </a:p>
-          </p:txBody>
-        </p:sp>
-      </p:grpSp>
-      <p:grpSp>
-        <p:nvGrpSpPr>
-          <p:cNvPr id="2" name="Group 1">
+          </a:ln>
+        </p:spPr>
+        <p:style>
+          <a:lnRef idx="2">
+            <a:schemeClr val="accent1">
+              <a:shade val="50000"/>
+            </a:schemeClr>
+          </a:lnRef>
+          <a:fillRef idx="1">
+            <a:schemeClr val="accent1"/>
+          </a:fillRef>
+          <a:effectRef idx="0">
+            <a:schemeClr val="accent1"/>
+          </a:effectRef>
+          <a:fontRef idx="minor">
+            <a:schemeClr val="lt1"/>
+          </a:fontRef>
+        </p:style>
+        <p:txBody>
+          <a:bodyPr rtlCol="0" anchor="ctr"/>
+          <a:lstStyle/>
+          <a:p>
+            <a:pPr algn="ctr"/>
+            <a:endParaRPr lang="en-US" sz="2000"/>
+          </a:p>
+        </p:txBody>
+      </p:sp>
+      <p:sp>
+        <p:nvSpPr>
+          <p:cNvPr id="83" name="Diamond 82">
             <a:extLst>
               <a:ext uri="{FF2B5EF4-FFF2-40B4-BE49-F238E27FC236}">
-                <a16:creationId xmlns:a16="http://schemas.microsoft.com/office/drawing/2014/main" id="{A1191A17-ABBA-E040-A9A5-0B23CE0B6E99}"/>
+                <a16:creationId xmlns:a16="http://schemas.microsoft.com/office/drawing/2014/main" id="{D29CEE02-70C3-5341-9592-CA946C667C47}"/>
               </a:ext>
             </a:extLst>
           </p:cNvPr>
-          <p:cNvGrpSpPr/>
+          <p:cNvSpPr/>
           <p:nvPr/>
-        </p:nvGrpSpPr>
-        <p:grpSpPr>
-          <a:xfrm>
-            <a:off x="1146700" y="5118075"/>
-            <a:ext cx="1861398" cy="898717"/>
-            <a:chOff x="1101600" y="5118075"/>
-            <a:chExt cx="1861398" cy="898717"/>
-          </a:xfrm>
-        </p:grpSpPr>
-        <p:cxnSp>
-          <p:nvCxnSpPr>
-            <p:cNvPr id="3" name="Straight Connector 2">
-              <a:extLst>
-                <a:ext uri="{FF2B5EF4-FFF2-40B4-BE49-F238E27FC236}">
-                  <a16:creationId xmlns:a16="http://schemas.microsoft.com/office/drawing/2014/main" id="{28DA7EB7-286D-894E-9559-1FA92A71AD27}"/>
-                </a:ext>
-              </a:extLst>
-            </p:cNvPr>
-            <p:cNvCxnSpPr>
-              <a:cxnSpLocks/>
-              <a:endCxn id="4" idx="1"/>
-            </p:cNvCxnSpPr>
-            <p:nvPr/>
-          </p:nvCxnSpPr>
-          <p:spPr>
-            <a:xfrm>
-              <a:off x="1101600" y="5467406"/>
-              <a:ext cx="1677177" cy="0"/>
-            </a:xfrm>
-            <a:prstGeom prst="line">
-              <a:avLst/>
-            </a:prstGeom>
-            <a:ln w="12700">
-              <a:solidFill>
-                <a:schemeClr val="tx1"/>
-              </a:solidFill>
-            </a:ln>
-          </p:spPr>
-          <p:style>
-            <a:lnRef idx="1">
-              <a:schemeClr val="accent1"/>
-            </a:lnRef>
-            <a:fillRef idx="0">
-              <a:schemeClr val="accent1"/>
-            </a:fillRef>
-            <a:effectRef idx="0">
-              <a:schemeClr val="accent1"/>
-            </a:effectRef>
-            <a:fontRef idx="minor">
-              <a:schemeClr val="tx1"/>
-            </a:fontRef>
-          </p:style>
-        </p:cxnSp>
-        <p:sp>
-          <p:nvSpPr>
-            <p:cNvPr id="4" name="Diamond 3">
-              <a:extLst>
-                <a:ext uri="{FF2B5EF4-FFF2-40B4-BE49-F238E27FC236}">
-                  <a16:creationId xmlns:a16="http://schemas.microsoft.com/office/drawing/2014/main" id="{2B1310DE-C022-8247-87BD-41AD5A877003}"/>
-                </a:ext>
-              </a:extLst>
-            </p:cNvPr>
-            <p:cNvSpPr/>
-            <p:nvPr/>
-          </p:nvSpPr>
-          <p:spPr>
-            <a:xfrm>
-              <a:off x="2778777" y="5406216"/>
-              <a:ext cx="184221" cy="122380"/>
-            </a:xfrm>
-            <a:prstGeom prst="diamond">
-              <a:avLst/>
-            </a:prstGeom>
+        </p:nvSpPr>
+        <p:spPr>
+          <a:xfrm rot="16200000">
+            <a:off x="8602703" y="2760816"/>
+            <a:ext cx="184221" cy="122380"/>
+          </a:xfrm>
+          <a:prstGeom prst="diamond">
+            <a:avLst/>
+          </a:prstGeom>
+          <a:solidFill>
+            <a:schemeClr val="tx1"/>
+          </a:solidFill>
+          <a:ln w="6350">
             <a:solidFill>
               <a:schemeClr val="tx1"/>
             </a:solidFill>
-            <a:ln w="6350">
-              <a:solidFill>
-                <a:schemeClr val="tx1"/>
-              </a:solidFill>
-            </a:ln>
-          </p:spPr>
-          <p:style>
-            <a:lnRef idx="2">
-              <a:schemeClr val="accent1">
-                <a:shade val="50000"/>
-              </a:schemeClr>
-            </a:lnRef>
-            <a:fillRef idx="1">
-              <a:schemeClr val="accent1"/>
-            </a:fillRef>
-            <a:effectRef idx="0">
-              <a:schemeClr val="accent1"/>
-            </a:effectRef>
-            <a:fontRef idx="minor">
-              <a:schemeClr val="lt1"/>
-            </a:fontRef>
-          </p:style>
-          <p:txBody>
-            <a:bodyPr rtlCol="0" anchor="ctr"/>
-            <a:lstStyle/>
-            <a:p>
-              <a:pPr algn="ctr"/>
-              <a:endParaRPr lang="en-US" sz="2000"/>
-            </a:p>
-          </p:txBody>
-        </p:sp>
-        <p:cxnSp>
-          <p:nvCxnSpPr>
-            <p:cNvPr id="5" name="Straight Connector 4">
-              <a:extLst>
-                <a:ext uri="{FF2B5EF4-FFF2-40B4-BE49-F238E27FC236}">
-                  <a16:creationId xmlns:a16="http://schemas.microsoft.com/office/drawing/2014/main" id="{387C9B7E-372D-FE4D-BA4E-031BD942C869}"/>
-                </a:ext>
-              </a:extLst>
-            </p:cNvPr>
-            <p:cNvCxnSpPr>
-              <a:cxnSpLocks/>
-              <a:endCxn id="6" idx="1"/>
-            </p:cNvCxnSpPr>
-            <p:nvPr/>
-          </p:nvCxnSpPr>
-          <p:spPr>
-            <a:xfrm>
-              <a:off x="1101600" y="5658745"/>
-              <a:ext cx="1677177" cy="0"/>
-            </a:xfrm>
-            <a:prstGeom prst="line">
-              <a:avLst/>
-            </a:prstGeom>
-            <a:ln w="12700">
-              <a:solidFill>
-                <a:schemeClr val="tx1"/>
-              </a:solidFill>
-            </a:ln>
-          </p:spPr>
-          <p:style>
-            <a:lnRef idx="1">
-              <a:schemeClr val="accent1"/>
-            </a:lnRef>
-            <a:fillRef idx="0">
-              <a:schemeClr val="accent1"/>
-            </a:fillRef>
-            <a:effectRef idx="0">
-              <a:schemeClr val="accent1"/>
-            </a:effectRef>
-            <a:fontRef idx="minor">
-              <a:schemeClr val="tx1"/>
-            </a:fontRef>
-          </p:style>
-        </p:cxnSp>
-        <p:sp>
-          <p:nvSpPr>
-            <p:cNvPr id="6" name="Diamond 5">
-              <a:extLst>
-                <a:ext uri="{FF2B5EF4-FFF2-40B4-BE49-F238E27FC236}">
-                  <a16:creationId xmlns:a16="http://schemas.microsoft.com/office/drawing/2014/main" id="{8489A98A-A874-C74F-A398-B5924CDC02E6}"/>
-                </a:ext>
-              </a:extLst>
-            </p:cNvPr>
-            <p:cNvSpPr/>
-            <p:nvPr/>
-          </p:nvSpPr>
-          <p:spPr>
-            <a:xfrm>
-              <a:off x="2778777" y="5597555"/>
-              <a:ext cx="184221" cy="122380"/>
-            </a:xfrm>
-            <a:prstGeom prst="diamond">
-              <a:avLst/>
-            </a:prstGeom>
+          </a:ln>
+        </p:spPr>
+        <p:style>
+          <a:lnRef idx="2">
+            <a:schemeClr val="accent1">
+              <a:shade val="50000"/>
+            </a:schemeClr>
+          </a:lnRef>
+          <a:fillRef idx="1">
+            <a:schemeClr val="accent1"/>
+          </a:fillRef>
+          <a:effectRef idx="0">
+            <a:schemeClr val="accent1"/>
+          </a:effectRef>
+          <a:fontRef idx="minor">
+            <a:schemeClr val="lt1"/>
+          </a:fontRef>
+        </p:style>
+        <p:txBody>
+          <a:bodyPr rtlCol="0" anchor="ctr"/>
+          <a:lstStyle/>
+          <a:p>
+            <a:pPr algn="ctr"/>
+            <a:endParaRPr lang="en-US" sz="2000"/>
+          </a:p>
+        </p:txBody>
+      </p:sp>
+      <p:cxnSp>
+        <p:nvCxnSpPr>
+          <p:cNvPr id="71" name="Straight Connector 70">
+            <a:extLst>
+              <a:ext uri="{FF2B5EF4-FFF2-40B4-BE49-F238E27FC236}">
+                <a16:creationId xmlns:a16="http://schemas.microsoft.com/office/drawing/2014/main" id="{F008CE88-AC2F-DF42-9552-CB8B88EFC569}"/>
+              </a:ext>
+            </a:extLst>
+          </p:cNvPr>
+          <p:cNvCxnSpPr>
+            <a:cxnSpLocks/>
+            <a:stCxn id="74" idx="1"/>
+            <a:endCxn id="72" idx="0"/>
+          </p:cNvCxnSpPr>
+          <p:nvPr/>
+        </p:nvCxnSpPr>
+        <p:spPr>
+          <a:xfrm flipH="1">
+            <a:off x="6897912" y="3454071"/>
+            <a:ext cx="1" cy="708978"/>
+          </a:xfrm>
+          <a:prstGeom prst="line">
+            <a:avLst/>
+          </a:prstGeom>
+          <a:ln w="12700">
             <a:solidFill>
               <a:schemeClr val="tx1"/>
             </a:solidFill>
-            <a:ln w="6350">
-              <a:solidFill>
-                <a:schemeClr val="tx1"/>
-              </a:solidFill>
-            </a:ln>
-          </p:spPr>
-          <p:style>
-            <a:lnRef idx="2">
-              <a:schemeClr val="accent1">
-                <a:shade val="50000"/>
-              </a:schemeClr>
-            </a:lnRef>
-            <a:fillRef idx="1">
-              <a:schemeClr val="accent1"/>
-            </a:fillRef>
-            <a:effectRef idx="0">
-              <a:schemeClr val="accent1"/>
-            </a:effectRef>
-            <a:fontRef idx="minor">
-              <a:schemeClr val="lt1"/>
-            </a:fontRef>
-          </p:style>
-          <p:txBody>
-            <a:bodyPr rtlCol="0" anchor="ctr"/>
-            <a:lstStyle/>
-            <a:p>
-              <a:pPr algn="ctr"/>
-              <a:endParaRPr lang="en-US" sz="2000"/>
-            </a:p>
-          </p:txBody>
-        </p:sp>
-        <p:sp>
-          <p:nvSpPr>
-            <p:cNvPr id="7" name="TextBox 6">
-              <a:extLst>
-                <a:ext uri="{FF2B5EF4-FFF2-40B4-BE49-F238E27FC236}">
-                  <a16:creationId xmlns:a16="http://schemas.microsoft.com/office/drawing/2014/main" id="{41CB8D42-2033-6F42-8A7D-50281B1148D4}"/>
-                </a:ext>
-              </a:extLst>
-            </p:cNvPr>
-            <p:cNvSpPr txBox="1"/>
-            <p:nvPr/>
-          </p:nvSpPr>
-          <p:spPr>
-            <a:xfrm>
-              <a:off x="1573657" y="5118075"/>
-              <a:ext cx="1301447" cy="400110"/>
-            </a:xfrm>
-            <a:prstGeom prst="rect">
-              <a:avLst/>
-            </a:prstGeom>
-            <a:noFill/>
-          </p:spPr>
-          <p:txBody>
-            <a:bodyPr wrap="none" rtlCol="0">
-              <a:spAutoFit/>
-            </a:bodyPr>
-            <a:lstStyle/>
-            <a:p>
-              <a:pPr algn="r"/>
-              <a:r>
-                <a:rPr lang="en-US" sz="2000">
-                  <a:cs typeface="Arial Narrow" panose="020B0604020202020204" pitchFamily="34" charset="0"/>
-                </a:rPr>
-                <a:t>numerator</a:t>
-              </a:r>
-            </a:p>
-          </p:txBody>
-        </p:sp>
-        <p:sp>
-          <p:nvSpPr>
-            <p:cNvPr id="8" name="TextBox 7">
-              <a:extLst>
-                <a:ext uri="{FF2B5EF4-FFF2-40B4-BE49-F238E27FC236}">
-                  <a16:creationId xmlns:a16="http://schemas.microsoft.com/office/drawing/2014/main" id="{97C94CBD-CED2-CD4C-9D39-4624ED154269}"/>
-                </a:ext>
-              </a:extLst>
-            </p:cNvPr>
-            <p:cNvSpPr txBox="1"/>
-            <p:nvPr/>
-          </p:nvSpPr>
-          <p:spPr>
-            <a:xfrm>
-              <a:off x="1329553" y="5616682"/>
-              <a:ext cx="1545551" cy="400110"/>
-            </a:xfrm>
-            <a:prstGeom prst="rect">
-              <a:avLst/>
-            </a:prstGeom>
-            <a:noFill/>
-          </p:spPr>
-          <p:txBody>
-            <a:bodyPr wrap="none" rtlCol="0">
-              <a:spAutoFit/>
-            </a:bodyPr>
-            <a:lstStyle/>
-            <a:p>
-              <a:pPr algn="r"/>
-              <a:r>
-                <a:rPr lang="en-US" sz="2000">
-                  <a:cs typeface="Arial Narrow" panose="020B0604020202020204" pitchFamily="34" charset="0"/>
-                </a:rPr>
-                <a:t>denominator</a:t>
-              </a:r>
-            </a:p>
-          </p:txBody>
-        </p:sp>
-      </p:grpSp>
+          </a:ln>
+        </p:spPr>
+        <p:style>
+          <a:lnRef idx="1">
+            <a:schemeClr val="accent1"/>
+          </a:lnRef>
+          <a:fillRef idx="0">
+            <a:schemeClr val="accent1"/>
+          </a:fillRef>
+          <a:effectRef idx="0">
+            <a:schemeClr val="accent1"/>
+          </a:effectRef>
+          <a:fontRef idx="minor">
+            <a:schemeClr val="tx1"/>
+          </a:fontRef>
+        </p:style>
+      </p:cxnSp>
+      <p:sp>
+        <p:nvSpPr>
+          <p:cNvPr id="73" name="TextBox 72">
+            <a:extLst>
+              <a:ext uri="{FF2B5EF4-FFF2-40B4-BE49-F238E27FC236}">
+                <a16:creationId xmlns:a16="http://schemas.microsoft.com/office/drawing/2014/main" id="{7A6870B8-8AE4-4D43-87B3-DFC73BC5A23B}"/>
+              </a:ext>
+            </a:extLst>
+          </p:cNvPr>
+          <p:cNvSpPr txBox="1"/>
+          <p:nvPr/>
+        </p:nvSpPr>
+        <p:spPr>
+          <a:xfrm>
+            <a:off x="6866365" y="3437581"/>
+            <a:ext cx="1214050" cy="307777"/>
+          </a:xfrm>
+          <a:prstGeom prst="rect">
+            <a:avLst/>
+          </a:prstGeom>
+          <a:noFill/>
+        </p:spPr>
+        <p:txBody>
+          <a:bodyPr wrap="none" rtlCol="0">
+            <a:spAutoFit/>
+          </a:bodyPr>
+          <a:lstStyle/>
+          <a:p>
+            <a:r>
+              <a:rPr lang="en-US" sz="1400">
+                <a:cs typeface="Arial Narrow" panose="020B0604020202020204" pitchFamily="34" charset="0"/>
+              </a:rPr>
+              <a:t>packageName</a:t>
+            </a:r>
+          </a:p>
+        </p:txBody>
+      </p:sp>
+      <p:sp>
+        <p:nvSpPr>
+          <p:cNvPr id="74" name="Diamond 73">
+            <a:extLst>
+              <a:ext uri="{FF2B5EF4-FFF2-40B4-BE49-F238E27FC236}">
+                <a16:creationId xmlns:a16="http://schemas.microsoft.com/office/drawing/2014/main" id="{A0FDD640-E870-1E4F-9D46-6592D4224F80}"/>
+              </a:ext>
+            </a:extLst>
+          </p:cNvPr>
+          <p:cNvSpPr/>
+          <p:nvPr/>
+        </p:nvSpPr>
+        <p:spPr>
+          <a:xfrm rot="16200000">
+            <a:off x="6805802" y="3300770"/>
+            <a:ext cx="184221" cy="122380"/>
+          </a:xfrm>
+          <a:prstGeom prst="diamond">
+            <a:avLst/>
+          </a:prstGeom>
+          <a:solidFill>
+            <a:schemeClr val="tx1"/>
+          </a:solidFill>
+          <a:ln w="6350">
+            <a:solidFill>
+              <a:schemeClr val="tx1"/>
+            </a:solidFill>
+          </a:ln>
+        </p:spPr>
+        <p:style>
+          <a:lnRef idx="2">
+            <a:schemeClr val="accent1">
+              <a:shade val="50000"/>
+            </a:schemeClr>
+          </a:lnRef>
+          <a:fillRef idx="1">
+            <a:schemeClr val="accent1"/>
+          </a:fillRef>
+          <a:effectRef idx="0">
+            <a:schemeClr val="accent1"/>
+          </a:effectRef>
+          <a:fontRef idx="minor">
+            <a:schemeClr val="lt1"/>
+          </a:fontRef>
+        </p:style>
+        <p:txBody>
+          <a:bodyPr rtlCol="0" anchor="ctr"/>
+          <a:lstStyle/>
+          <a:p>
+            <a:pPr algn="ctr"/>
+            <a:endParaRPr lang="en-US" sz="2000"/>
+          </a:p>
+        </p:txBody>
+      </p:sp>
+      <p:cxnSp>
+        <p:nvCxnSpPr>
+          <p:cNvPr id="67" name="Straight Connector 66">
+            <a:extLst>
+              <a:ext uri="{FF2B5EF4-FFF2-40B4-BE49-F238E27FC236}">
+                <a16:creationId xmlns:a16="http://schemas.microsoft.com/office/drawing/2014/main" id="{7603C0CC-3097-544B-9CAE-19FF6AFBF8E6}"/>
+              </a:ext>
+            </a:extLst>
+          </p:cNvPr>
+          <p:cNvCxnSpPr>
+            <a:cxnSpLocks/>
+            <a:endCxn id="68" idx="1"/>
+          </p:cNvCxnSpPr>
+          <p:nvPr/>
+        </p:nvCxnSpPr>
+        <p:spPr>
+          <a:xfrm>
+            <a:off x="5073649" y="3088870"/>
+            <a:ext cx="979420" cy="6210"/>
+          </a:xfrm>
+          <a:prstGeom prst="line">
+            <a:avLst/>
+          </a:prstGeom>
+          <a:ln w="12700">
+            <a:solidFill>
+              <a:schemeClr val="tx1"/>
+            </a:solidFill>
+          </a:ln>
+        </p:spPr>
+        <p:style>
+          <a:lnRef idx="1">
+            <a:schemeClr val="accent1"/>
+          </a:lnRef>
+          <a:fillRef idx="0">
+            <a:schemeClr val="accent1"/>
+          </a:fillRef>
+          <a:effectRef idx="0">
+            <a:schemeClr val="accent1"/>
+          </a:effectRef>
+          <a:fontRef idx="minor">
+            <a:schemeClr val="tx1"/>
+          </a:fontRef>
+        </p:style>
+      </p:cxnSp>
+      <p:sp>
+        <p:nvSpPr>
+          <p:cNvPr id="68" name="Diamond 67">
+            <a:extLst>
+              <a:ext uri="{FF2B5EF4-FFF2-40B4-BE49-F238E27FC236}">
+                <a16:creationId xmlns:a16="http://schemas.microsoft.com/office/drawing/2014/main" id="{5A5DC852-595B-494F-81C8-438225BCFBEC}"/>
+              </a:ext>
+            </a:extLst>
+          </p:cNvPr>
+          <p:cNvSpPr/>
+          <p:nvPr/>
+        </p:nvSpPr>
+        <p:spPr>
+          <a:xfrm>
+            <a:off x="6053069" y="3033890"/>
+            <a:ext cx="184221" cy="122380"/>
+          </a:xfrm>
+          <a:prstGeom prst="diamond">
+            <a:avLst/>
+          </a:prstGeom>
+          <a:solidFill>
+            <a:schemeClr val="tx1"/>
+          </a:solidFill>
+          <a:ln w="6350">
+            <a:solidFill>
+              <a:schemeClr val="tx1"/>
+            </a:solidFill>
+          </a:ln>
+        </p:spPr>
+        <p:style>
+          <a:lnRef idx="2">
+            <a:schemeClr val="accent1">
+              <a:shade val="50000"/>
+            </a:schemeClr>
+          </a:lnRef>
+          <a:fillRef idx="1">
+            <a:schemeClr val="accent1"/>
+          </a:fillRef>
+          <a:effectRef idx="0">
+            <a:schemeClr val="accent1"/>
+          </a:effectRef>
+          <a:fontRef idx="minor">
+            <a:schemeClr val="lt1"/>
+          </a:fontRef>
+        </p:style>
+        <p:txBody>
+          <a:bodyPr rtlCol="0" anchor="ctr"/>
+          <a:lstStyle/>
+          <a:p>
+            <a:pPr algn="ctr"/>
+            <a:endParaRPr lang="en-US" sz="2000"/>
+          </a:p>
+        </p:txBody>
+      </p:sp>
+      <p:sp>
+        <p:nvSpPr>
+          <p:cNvPr id="69" name="TextBox 68">
+            <a:extLst>
+              <a:ext uri="{FF2B5EF4-FFF2-40B4-BE49-F238E27FC236}">
+                <a16:creationId xmlns:a16="http://schemas.microsoft.com/office/drawing/2014/main" id="{0D1272CD-FB93-1540-8B4E-0314A8A75325}"/>
+              </a:ext>
+            </a:extLst>
+          </p:cNvPr>
+          <p:cNvSpPr txBox="1"/>
+          <p:nvPr/>
+        </p:nvSpPr>
+        <p:spPr>
+          <a:xfrm>
+            <a:off x="5510600" y="2820908"/>
+            <a:ext cx="598241" cy="307777"/>
+          </a:xfrm>
+          <a:prstGeom prst="rect">
+            <a:avLst/>
+          </a:prstGeom>
+          <a:noFill/>
+        </p:spPr>
+        <p:txBody>
+          <a:bodyPr wrap="none" rtlCol="0">
+            <a:spAutoFit/>
+          </a:bodyPr>
+          <a:lstStyle/>
+          <a:p>
+            <a:r>
+              <a:rPr lang="en-US" sz="1400">
+                <a:cs typeface="Arial Narrow" panose="020B0604020202020204" pitchFamily="34" charset="0"/>
+              </a:rPr>
+              <a:t>name</a:t>
+            </a:r>
+          </a:p>
+        </p:txBody>
+      </p:sp>
+      <p:cxnSp>
+        <p:nvCxnSpPr>
+          <p:cNvPr id="3" name="Straight Connector 2">
+            <a:extLst>
+              <a:ext uri="{FF2B5EF4-FFF2-40B4-BE49-F238E27FC236}">
+                <a16:creationId xmlns:a16="http://schemas.microsoft.com/office/drawing/2014/main" id="{28DA7EB7-286D-894E-9559-1FA92A71AD27}"/>
+              </a:ext>
+            </a:extLst>
+          </p:cNvPr>
+          <p:cNvCxnSpPr>
+            <a:cxnSpLocks/>
+            <a:endCxn id="4" idx="1"/>
+          </p:cNvCxnSpPr>
+          <p:nvPr/>
+        </p:nvCxnSpPr>
+        <p:spPr>
+          <a:xfrm>
+            <a:off x="1043323" y="5467406"/>
+            <a:ext cx="1677177" cy="0"/>
+          </a:xfrm>
+          <a:prstGeom prst="line">
+            <a:avLst/>
+          </a:prstGeom>
+          <a:ln w="12700">
+            <a:solidFill>
+              <a:schemeClr val="tx1"/>
+            </a:solidFill>
+          </a:ln>
+        </p:spPr>
+        <p:style>
+          <a:lnRef idx="1">
+            <a:schemeClr val="accent1"/>
+          </a:lnRef>
+          <a:fillRef idx="0">
+            <a:schemeClr val="accent1"/>
+          </a:fillRef>
+          <a:effectRef idx="0">
+            <a:schemeClr val="accent1"/>
+          </a:effectRef>
+          <a:fontRef idx="minor">
+            <a:schemeClr val="tx1"/>
+          </a:fontRef>
+        </p:style>
+      </p:cxnSp>
+      <p:sp>
+        <p:nvSpPr>
+          <p:cNvPr id="4" name="Diamond 3">
+            <a:extLst>
+              <a:ext uri="{FF2B5EF4-FFF2-40B4-BE49-F238E27FC236}">
+                <a16:creationId xmlns:a16="http://schemas.microsoft.com/office/drawing/2014/main" id="{2B1310DE-C022-8247-87BD-41AD5A877003}"/>
+              </a:ext>
+            </a:extLst>
+          </p:cNvPr>
+          <p:cNvSpPr/>
+          <p:nvPr/>
+        </p:nvSpPr>
+        <p:spPr>
+          <a:xfrm>
+            <a:off x="2720500" y="5406216"/>
+            <a:ext cx="184221" cy="122380"/>
+          </a:xfrm>
+          <a:prstGeom prst="diamond">
+            <a:avLst/>
+          </a:prstGeom>
+          <a:solidFill>
+            <a:schemeClr val="tx1"/>
+          </a:solidFill>
+          <a:ln w="6350">
+            <a:solidFill>
+              <a:schemeClr val="tx1"/>
+            </a:solidFill>
+          </a:ln>
+        </p:spPr>
+        <p:style>
+          <a:lnRef idx="2">
+            <a:schemeClr val="accent1">
+              <a:shade val="50000"/>
+            </a:schemeClr>
+          </a:lnRef>
+          <a:fillRef idx="1">
+            <a:schemeClr val="accent1"/>
+          </a:fillRef>
+          <a:effectRef idx="0">
+            <a:schemeClr val="accent1"/>
+          </a:effectRef>
+          <a:fontRef idx="minor">
+            <a:schemeClr val="lt1"/>
+          </a:fontRef>
+        </p:style>
+        <p:txBody>
+          <a:bodyPr rtlCol="0" anchor="ctr"/>
+          <a:lstStyle/>
+          <a:p>
+            <a:pPr algn="ctr"/>
+            <a:endParaRPr lang="en-US" sz="2000"/>
+          </a:p>
+        </p:txBody>
+      </p:sp>
+      <p:cxnSp>
+        <p:nvCxnSpPr>
+          <p:cNvPr id="5" name="Straight Connector 4">
+            <a:extLst>
+              <a:ext uri="{FF2B5EF4-FFF2-40B4-BE49-F238E27FC236}">
+                <a16:creationId xmlns:a16="http://schemas.microsoft.com/office/drawing/2014/main" id="{387C9B7E-372D-FE4D-BA4E-031BD942C869}"/>
+              </a:ext>
+            </a:extLst>
+          </p:cNvPr>
+          <p:cNvCxnSpPr>
+            <a:cxnSpLocks/>
+            <a:endCxn id="6" idx="1"/>
+          </p:cNvCxnSpPr>
+          <p:nvPr/>
+        </p:nvCxnSpPr>
+        <p:spPr>
+          <a:xfrm>
+            <a:off x="1043323" y="5658745"/>
+            <a:ext cx="1677177" cy="0"/>
+          </a:xfrm>
+          <a:prstGeom prst="line">
+            <a:avLst/>
+          </a:prstGeom>
+          <a:ln w="12700">
+            <a:solidFill>
+              <a:schemeClr val="tx1"/>
+            </a:solidFill>
+          </a:ln>
+        </p:spPr>
+        <p:style>
+          <a:lnRef idx="1">
+            <a:schemeClr val="accent1"/>
+          </a:lnRef>
+          <a:fillRef idx="0">
+            <a:schemeClr val="accent1"/>
+          </a:fillRef>
+          <a:effectRef idx="0">
+            <a:schemeClr val="accent1"/>
+          </a:effectRef>
+          <a:fontRef idx="minor">
+            <a:schemeClr val="tx1"/>
+          </a:fontRef>
+        </p:style>
+      </p:cxnSp>
+      <p:sp>
+        <p:nvSpPr>
+          <p:cNvPr id="6" name="Diamond 5">
+            <a:extLst>
+              <a:ext uri="{FF2B5EF4-FFF2-40B4-BE49-F238E27FC236}">
+                <a16:creationId xmlns:a16="http://schemas.microsoft.com/office/drawing/2014/main" id="{8489A98A-A874-C74F-A398-B5924CDC02E6}"/>
+              </a:ext>
+            </a:extLst>
+          </p:cNvPr>
+          <p:cNvSpPr/>
+          <p:nvPr/>
+        </p:nvSpPr>
+        <p:spPr>
+          <a:xfrm>
+            <a:off x="2720500" y="5597555"/>
+            <a:ext cx="184221" cy="122380"/>
+          </a:xfrm>
+          <a:prstGeom prst="diamond">
+            <a:avLst/>
+          </a:prstGeom>
+          <a:solidFill>
+            <a:schemeClr val="tx1"/>
+          </a:solidFill>
+          <a:ln w="6350">
+            <a:solidFill>
+              <a:schemeClr val="tx1"/>
+            </a:solidFill>
+          </a:ln>
+        </p:spPr>
+        <p:style>
+          <a:lnRef idx="2">
+            <a:schemeClr val="accent1">
+              <a:shade val="50000"/>
+            </a:schemeClr>
+          </a:lnRef>
+          <a:fillRef idx="1">
+            <a:schemeClr val="accent1"/>
+          </a:fillRef>
+          <a:effectRef idx="0">
+            <a:schemeClr val="accent1"/>
+          </a:effectRef>
+          <a:fontRef idx="minor">
+            <a:schemeClr val="lt1"/>
+          </a:fontRef>
+        </p:style>
+        <p:txBody>
+          <a:bodyPr rtlCol="0" anchor="ctr"/>
+          <a:lstStyle/>
+          <a:p>
+            <a:pPr algn="ctr"/>
+            <a:endParaRPr lang="en-US" sz="2000"/>
+          </a:p>
+        </p:txBody>
+      </p:sp>
+      <p:sp>
+        <p:nvSpPr>
+          <p:cNvPr id="7" name="TextBox 6">
+            <a:extLst>
+              <a:ext uri="{FF2B5EF4-FFF2-40B4-BE49-F238E27FC236}">
+                <a16:creationId xmlns:a16="http://schemas.microsoft.com/office/drawing/2014/main" id="{41CB8D42-2033-6F42-8A7D-50281B1148D4}"/>
+              </a:ext>
+            </a:extLst>
+          </p:cNvPr>
+          <p:cNvSpPr txBox="1"/>
+          <p:nvPr/>
+        </p:nvSpPr>
+        <p:spPr>
+          <a:xfrm>
+            <a:off x="1812274" y="5192813"/>
+            <a:ext cx="966290" cy="307777"/>
+          </a:xfrm>
+          <a:prstGeom prst="rect">
+            <a:avLst/>
+          </a:prstGeom>
+          <a:noFill/>
+        </p:spPr>
+        <p:txBody>
+          <a:bodyPr wrap="none" rtlCol="0">
+            <a:spAutoFit/>
+          </a:bodyPr>
+          <a:lstStyle/>
+          <a:p>
+            <a:pPr algn="r"/>
+            <a:r>
+              <a:rPr lang="en-US" sz="1400">
+                <a:cs typeface="Arial Narrow" panose="020B0604020202020204" pitchFamily="34" charset="0"/>
+              </a:rPr>
+              <a:t>numerator</a:t>
+            </a:r>
+          </a:p>
+        </p:txBody>
+      </p:sp>
+      <p:sp>
+        <p:nvSpPr>
+          <p:cNvPr id="8" name="TextBox 7">
+            <a:extLst>
+              <a:ext uri="{FF2B5EF4-FFF2-40B4-BE49-F238E27FC236}">
+                <a16:creationId xmlns:a16="http://schemas.microsoft.com/office/drawing/2014/main" id="{97C94CBD-CED2-CD4C-9D39-4624ED154269}"/>
+              </a:ext>
+            </a:extLst>
+          </p:cNvPr>
+          <p:cNvSpPr txBox="1"/>
+          <p:nvPr/>
+        </p:nvSpPr>
+        <p:spPr>
+          <a:xfrm>
+            <a:off x="1640304" y="5612582"/>
+            <a:ext cx="1138260" cy="307777"/>
+          </a:xfrm>
+          <a:prstGeom prst="rect">
+            <a:avLst/>
+          </a:prstGeom>
+          <a:noFill/>
+        </p:spPr>
+        <p:txBody>
+          <a:bodyPr wrap="none" rtlCol="0">
+            <a:spAutoFit/>
+          </a:bodyPr>
+          <a:lstStyle/>
+          <a:p>
+            <a:pPr algn="r"/>
+            <a:r>
+              <a:rPr lang="en-US" sz="1400">
+                <a:cs typeface="Arial Narrow" panose="020B0604020202020204" pitchFamily="34" charset="0"/>
+              </a:rPr>
+              <a:t>denominator</a:t>
+            </a:r>
+          </a:p>
+        </p:txBody>
+      </p:sp>
       <p:sp>
         <p:nvSpPr>
           <p:cNvPr id="10" name="Triangle 9">
@@ -4360,7 +4259,7 @@
         </p:nvSpPr>
         <p:spPr>
           <a:xfrm>
-            <a:off x="4737320" y="2030634"/>
+            <a:off x="4926947" y="1996531"/>
             <a:ext cx="115527" cy="158382"/>
           </a:xfrm>
           <a:prstGeom prst="triangle">
@@ -4414,7 +4313,7 @@
         </p:nvSpPr>
         <p:spPr>
           <a:xfrm>
-            <a:off x="2233678" y="3294130"/>
+            <a:off x="1667225" y="3265409"/>
             <a:ext cx="115527" cy="158382"/>
           </a:xfrm>
           <a:prstGeom prst="triangle">
@@ -4470,9 +4369,9 @@
           <p:nvPr/>
         </p:nvCxnSpPr>
         <p:spPr>
-          <a:xfrm flipH="1">
-            <a:off x="2291441" y="3452512"/>
-            <a:ext cx="1" cy="287526"/>
+          <a:xfrm>
+            <a:off x="1724989" y="3423791"/>
+            <a:ext cx="0" cy="310983"/>
           </a:xfrm>
           <a:prstGeom prst="line">
             <a:avLst/>
@@ -4515,8 +4414,8 @@
         </p:nvCxnSpPr>
         <p:spPr>
           <a:xfrm>
-            <a:off x="1324088" y="3740038"/>
-            <a:ext cx="0" cy="392233"/>
+            <a:off x="1250105" y="3740038"/>
+            <a:ext cx="0" cy="423011"/>
           </a:xfrm>
           <a:prstGeom prst="line">
             <a:avLst/>
@@ -4558,8 +4457,8 @@
         </p:nvCxnSpPr>
         <p:spPr>
           <a:xfrm>
-            <a:off x="1324087" y="3742974"/>
-            <a:ext cx="3583478" cy="0"/>
+            <a:off x="1250105" y="3742974"/>
+            <a:ext cx="3491157" cy="0"/>
           </a:xfrm>
           <a:prstGeom prst="line">
             <a:avLst/>
@@ -4646,8 +4545,8 @@
         </p:nvCxnSpPr>
         <p:spPr>
           <a:xfrm flipH="1">
-            <a:off x="687053" y="5004168"/>
-            <a:ext cx="2" cy="359397"/>
+            <a:off x="687055" y="5004168"/>
+            <a:ext cx="2" cy="390175"/>
           </a:xfrm>
           <a:prstGeom prst="line">
             <a:avLst/>
@@ -4689,9 +4588,9 @@
           <p:nvPr/>
         </p:nvCxnSpPr>
         <p:spPr>
-          <a:xfrm>
-            <a:off x="3491179" y="4998924"/>
-            <a:ext cx="0" cy="364641"/>
+          <a:xfrm flipH="1">
+            <a:off x="3491178" y="4998924"/>
+            <a:ext cx="1" cy="395419"/>
           </a:xfrm>
           <a:prstGeom prst="line">
             <a:avLst/>
@@ -4777,8 +4676,8 @@
         </p:nvCxnSpPr>
         <p:spPr>
           <a:xfrm>
-            <a:off x="4795084" y="2189016"/>
-            <a:ext cx="0" cy="298008"/>
+            <a:off x="4984711" y="2154913"/>
+            <a:ext cx="0" cy="325345"/>
           </a:xfrm>
           <a:prstGeom prst="line">
             <a:avLst/>
@@ -4820,8 +4719,8 @@
         </p:nvCxnSpPr>
         <p:spPr>
           <a:xfrm>
-            <a:off x="2289680" y="2487024"/>
-            <a:ext cx="6072360" cy="0"/>
+            <a:off x="1724270" y="2489960"/>
+            <a:ext cx="6657160" cy="0"/>
           </a:xfrm>
           <a:prstGeom prst="line">
             <a:avLst/>
@@ -4864,8 +4763,8 @@
         </p:nvCxnSpPr>
         <p:spPr>
           <a:xfrm>
-            <a:off x="2291440" y="2494185"/>
-            <a:ext cx="0" cy="394630"/>
+            <a:off x="1724270" y="2494185"/>
+            <a:ext cx="0" cy="425408"/>
           </a:xfrm>
           <a:prstGeom prst="line">
             <a:avLst/>
@@ -4908,8 +4807,8 @@
         </p:nvCxnSpPr>
         <p:spPr>
           <a:xfrm>
-            <a:off x="8364697" y="2487024"/>
-            <a:ext cx="0" cy="400532"/>
+            <a:off x="8381430" y="2487024"/>
+            <a:ext cx="2" cy="431310"/>
           </a:xfrm>
           <a:prstGeom prst="line">
             <a:avLst/>
@@ -4949,8 +4848,8 @@
         </p:nvSpPr>
         <p:spPr>
           <a:xfrm>
-            <a:off x="7926115" y="2887556"/>
-            <a:ext cx="877163" cy="400110"/>
+            <a:off x="7674956" y="2918334"/>
+            <a:ext cx="1412951" cy="338554"/>
           </a:xfrm>
           <a:prstGeom prst="rect">
             <a:avLst/>
@@ -4991,13 +4890,13 @@
           <a:p>
             <a:pPr algn="ctr"/>
             <a:r>
-              <a:rPr lang="en-US" sz="2000">
+              <a:rPr lang="en-US" sz="1600">
                 <a:solidFill>
                   <a:schemeClr val="tx1"/>
                 </a:solidFill>
                 <a:cs typeface="Arial Narrow" panose="020B0604020202020204" pitchFamily="34" charset="0"/>
               </a:rPr>
-              <a:t>+ Cons</a:t>
+              <a:t>+ Acl2ConsPair</a:t>
             </a:r>
           </a:p>
         </p:txBody>
@@ -5016,8 +4915,8 @@
         </p:nvSpPr>
         <p:spPr>
           <a:xfrm>
-            <a:off x="1685344" y="2888815"/>
-            <a:ext cx="1212191" cy="400110"/>
+            <a:off x="1042833" y="2919593"/>
+            <a:ext cx="1362874" cy="338554"/>
           </a:xfrm>
           <a:prstGeom prst="rect">
             <a:avLst/>
@@ -5058,7 +4957,7 @@
           <a:p>
             <a:pPr algn="ctr"/>
             <a:r>
-              <a:rPr lang="en-US" sz="2000">
+              <a:rPr lang="en-US" sz="1600">
                 <a:solidFill>
                   <a:schemeClr val="tx1"/>
                 </a:solidFill>
@@ -5067,13 +4966,13 @@
               <a:t>+ </a:t>
             </a:r>
             <a:r>
-              <a:rPr lang="en-US" sz="2000" i="1">
+              <a:rPr lang="en-US" sz="1600" i="1">
                 <a:solidFill>
                   <a:schemeClr val="tx1"/>
                 </a:solidFill>
                 <a:cs typeface="Arial Narrow" panose="020B0604020202020204" pitchFamily="34" charset="0"/>
               </a:rPr>
-              <a:t>Number</a:t>
+              <a:t>Acl2Number</a:t>
             </a:r>
           </a:p>
         </p:txBody>
@@ -5092,8 +4991,8 @@
         </p:nvSpPr>
         <p:spPr>
           <a:xfrm>
-            <a:off x="129464" y="5363565"/>
-            <a:ext cx="1115178" cy="400110"/>
+            <a:off x="44603" y="5394343"/>
+            <a:ext cx="1284903" cy="338554"/>
           </a:xfrm>
           <a:prstGeom prst="rect">
             <a:avLst/>
@@ -5134,13 +5033,13 @@
           <a:p>
             <a:pPr algn="ctr"/>
             <a:r>
-              <a:rPr lang="en-US" sz="2000">
+              <a:rPr lang="en-US" sz="1600">
                 <a:solidFill>
                   <a:schemeClr val="tx1"/>
                 </a:solidFill>
                 <a:cs typeface="Arial Narrow" panose="020B0604020202020204" pitchFamily="34" charset="0"/>
               </a:rPr>
-              <a:t>+ Integer</a:t>
+              <a:t>+ Acl2Integer</a:t>
             </a:r>
           </a:p>
         </p:txBody>
@@ -5159,8 +5058,8 @@
         </p:nvSpPr>
         <p:spPr>
           <a:xfrm>
-            <a:off x="4321079" y="1622902"/>
-            <a:ext cx="948015" cy="400110"/>
+            <a:off x="4409268" y="1653680"/>
+            <a:ext cx="1150892" cy="338554"/>
           </a:xfrm>
           <a:prstGeom prst="rect">
             <a:avLst/>
@@ -5201,7 +5100,7 @@
           <a:p>
             <a:pPr algn="ctr"/>
             <a:r>
-              <a:rPr lang="en-US" sz="2000">
+              <a:rPr lang="en-US" sz="1600">
                 <a:solidFill>
                   <a:schemeClr val="tx1"/>
                 </a:solidFill>
@@ -5210,13 +5109,13 @@
               <a:t>+ </a:t>
             </a:r>
             <a:r>
-              <a:rPr lang="en-US" sz="2000" i="1">
+              <a:rPr lang="en-US" sz="1600" i="1">
                 <a:solidFill>
                   <a:schemeClr val="tx1"/>
                 </a:solidFill>
                 <a:cs typeface="Arial Narrow" panose="020B0604020202020204" pitchFamily="34" charset="0"/>
               </a:rPr>
-              <a:t>Value</a:t>
+              <a:t>Acl2Value</a:t>
             </a:r>
           </a:p>
         </p:txBody>
@@ -5235,8 +5134,8 @@
         </p:nvSpPr>
         <p:spPr>
           <a:xfrm>
-            <a:off x="3008098" y="5363565"/>
-            <a:ext cx="966162" cy="400110"/>
+            <a:off x="2908486" y="5394343"/>
+            <a:ext cx="1165384" cy="338554"/>
           </a:xfrm>
           <a:prstGeom prst="rect">
             <a:avLst/>
@@ -5277,13 +5176,13 @@
           <a:p>
             <a:pPr algn="ctr"/>
             <a:r>
-              <a:rPr lang="en-US" sz="2000">
+              <a:rPr lang="en-US" sz="1600">
                 <a:solidFill>
                   <a:schemeClr val="tx1"/>
                 </a:solidFill>
                 <a:cs typeface="Arial Narrow" panose="020B0604020202020204" pitchFamily="34" charset="0"/>
               </a:rPr>
-              <a:t>∼ Ratio</a:t>
+              <a:t>∼ Acl2Ratio</a:t>
             </a:r>
           </a:p>
         </p:txBody>
@@ -5305,8 +5204,8 @@
         </p:nvCxnSpPr>
         <p:spPr>
           <a:xfrm flipH="1">
-            <a:off x="4907565" y="3740038"/>
-            <a:ext cx="3" cy="392233"/>
+            <a:off x="4741262" y="3740038"/>
+            <a:ext cx="5" cy="423011"/>
           </a:xfrm>
           <a:prstGeom prst="line">
             <a:avLst/>
@@ -5332,299 +5231,278 @@
           </a:fontRef>
         </p:style>
       </p:cxnSp>
-      <p:grpSp>
-        <p:nvGrpSpPr>
-          <p:cNvPr id="47" name="Group 46">
+      <p:cxnSp>
+        <p:nvCxnSpPr>
+          <p:cNvPr id="38" name="Straight Connector 37">
             <a:extLst>
               <a:ext uri="{FF2B5EF4-FFF2-40B4-BE49-F238E27FC236}">
-                <a16:creationId xmlns:a16="http://schemas.microsoft.com/office/drawing/2014/main" id="{F1134D96-D202-1E43-8A35-8F07A8AFB25C}"/>
+                <a16:creationId xmlns:a16="http://schemas.microsoft.com/office/drawing/2014/main" id="{58CA2A12-515D-2546-88BE-C05E5DB4F0CF}"/>
               </a:ext>
             </a:extLst>
           </p:cNvPr>
-          <p:cNvGrpSpPr/>
+          <p:cNvCxnSpPr>
+            <a:cxnSpLocks/>
+            <a:endCxn id="39" idx="1"/>
+          </p:cNvCxnSpPr>
           <p:nvPr/>
-        </p:nvGrpSpPr>
-        <p:grpSpPr>
-          <a:xfrm>
-            <a:off x="1844403" y="3912665"/>
-            <a:ext cx="1973609" cy="864863"/>
-            <a:chOff x="1799303" y="3912665"/>
-            <a:chExt cx="1973609" cy="864863"/>
-          </a:xfrm>
-        </p:grpSpPr>
-        <p:cxnSp>
-          <p:nvCxnSpPr>
-            <p:cNvPr id="38" name="Straight Connector 37">
-              <a:extLst>
-                <a:ext uri="{FF2B5EF4-FFF2-40B4-BE49-F238E27FC236}">
-                  <a16:creationId xmlns:a16="http://schemas.microsoft.com/office/drawing/2014/main" id="{58CA2A12-515D-2546-88BE-C05E5DB4F0CF}"/>
-                </a:ext>
-              </a:extLst>
-            </p:cNvPr>
-            <p:cNvCxnSpPr>
-              <a:cxnSpLocks/>
-              <a:endCxn id="39" idx="1"/>
-            </p:cNvCxnSpPr>
-            <p:nvPr/>
-          </p:nvCxnSpPr>
-          <p:spPr>
-            <a:xfrm flipV="1">
-              <a:off x="1799303" y="4241561"/>
-              <a:ext cx="1789388" cy="1"/>
-            </a:xfrm>
-            <a:prstGeom prst="line">
-              <a:avLst/>
-            </a:prstGeom>
-            <a:ln w="12700">
-              <a:solidFill>
-                <a:schemeClr val="tx1"/>
-              </a:solidFill>
-            </a:ln>
-          </p:spPr>
-          <p:style>
-            <a:lnRef idx="1">
-              <a:schemeClr val="accent1"/>
-            </a:lnRef>
-            <a:fillRef idx="0">
-              <a:schemeClr val="accent1"/>
-            </a:fillRef>
-            <a:effectRef idx="0">
-              <a:schemeClr val="accent1"/>
-            </a:effectRef>
-            <a:fontRef idx="minor">
-              <a:schemeClr val="tx1"/>
-            </a:fontRef>
-          </p:style>
-        </p:cxnSp>
-        <p:sp>
-          <p:nvSpPr>
-            <p:cNvPr id="39" name="Diamond 38">
-              <a:extLst>
-                <a:ext uri="{FF2B5EF4-FFF2-40B4-BE49-F238E27FC236}">
-                  <a16:creationId xmlns:a16="http://schemas.microsoft.com/office/drawing/2014/main" id="{F21A8CD5-E993-4749-B2F7-9EEF30D0D8DF}"/>
-                </a:ext>
-              </a:extLst>
-            </p:cNvPr>
-            <p:cNvSpPr/>
-            <p:nvPr/>
-          </p:nvSpPr>
-          <p:spPr>
-            <a:xfrm>
-              <a:off x="3588691" y="4180371"/>
-              <a:ext cx="184221" cy="122380"/>
-            </a:xfrm>
-            <a:prstGeom prst="diamond">
-              <a:avLst/>
-            </a:prstGeom>
+        </p:nvCxnSpPr>
+        <p:spPr>
+          <a:xfrm flipV="1">
+            <a:off x="1697584" y="4241561"/>
+            <a:ext cx="1789388" cy="1"/>
+          </a:xfrm>
+          <a:prstGeom prst="line">
+            <a:avLst/>
+          </a:prstGeom>
+          <a:ln w="12700">
             <a:solidFill>
               <a:schemeClr val="tx1"/>
             </a:solidFill>
-            <a:ln w="6350">
-              <a:solidFill>
-                <a:schemeClr val="tx1"/>
-              </a:solidFill>
-            </a:ln>
-          </p:spPr>
-          <p:style>
-            <a:lnRef idx="2">
-              <a:schemeClr val="accent1">
-                <a:shade val="50000"/>
-              </a:schemeClr>
-            </a:lnRef>
-            <a:fillRef idx="1">
-              <a:schemeClr val="accent1"/>
-            </a:fillRef>
-            <a:effectRef idx="0">
-              <a:schemeClr val="accent1"/>
-            </a:effectRef>
-            <a:fontRef idx="minor">
-              <a:schemeClr val="lt1"/>
-            </a:fontRef>
-          </p:style>
-          <p:txBody>
-            <a:bodyPr rtlCol="0" anchor="ctr"/>
-            <a:lstStyle/>
-            <a:p>
-              <a:pPr algn="ctr"/>
-              <a:endParaRPr lang="en-US" sz="2000"/>
-            </a:p>
-          </p:txBody>
-        </p:sp>
-        <p:sp>
-          <p:nvSpPr>
-            <p:cNvPr id="40" name="TextBox 39">
-              <a:extLst>
-                <a:ext uri="{FF2B5EF4-FFF2-40B4-BE49-F238E27FC236}">
-                  <a16:creationId xmlns:a16="http://schemas.microsoft.com/office/drawing/2014/main" id="{5E1E3B53-C08A-B141-8340-6EB7237D6CDA}"/>
-                </a:ext>
-              </a:extLst>
-            </p:cNvPr>
-            <p:cNvSpPr txBox="1"/>
-            <p:nvPr/>
-          </p:nvSpPr>
-          <p:spPr>
-            <a:xfrm>
-              <a:off x="2664286" y="3912665"/>
-              <a:ext cx="1009315" cy="400110"/>
-            </a:xfrm>
-            <a:prstGeom prst="rect">
-              <a:avLst/>
-            </a:prstGeom>
-            <a:noFill/>
-          </p:spPr>
-          <p:txBody>
-            <a:bodyPr wrap="none" rtlCol="0">
-              <a:spAutoFit/>
-            </a:bodyPr>
-            <a:lstStyle/>
-            <a:p>
-              <a:pPr algn="r"/>
-              <a:r>
-                <a:rPr lang="en-US" sz="2000">
-                  <a:cs typeface="Arial Narrow" panose="020B0604020202020204" pitchFamily="34" charset="0"/>
-                </a:rPr>
-                <a:t>realPart</a:t>
-              </a:r>
-            </a:p>
-          </p:txBody>
-        </p:sp>
-        <p:sp>
-          <p:nvSpPr>
-            <p:cNvPr id="41" name="TextBox 40">
-              <a:extLst>
-                <a:ext uri="{FF2B5EF4-FFF2-40B4-BE49-F238E27FC236}">
-                  <a16:creationId xmlns:a16="http://schemas.microsoft.com/office/drawing/2014/main" id="{EF997AA4-D994-C34C-9FE8-CD23B7C4DD96}"/>
-                </a:ext>
-              </a:extLst>
-            </p:cNvPr>
-            <p:cNvSpPr txBox="1"/>
-            <p:nvPr/>
-          </p:nvSpPr>
-          <p:spPr>
-            <a:xfrm>
-              <a:off x="2029625" y="4377418"/>
-              <a:ext cx="1643976" cy="400110"/>
-            </a:xfrm>
-            <a:prstGeom prst="rect">
-              <a:avLst/>
-            </a:prstGeom>
-            <a:noFill/>
-          </p:spPr>
-          <p:txBody>
-            <a:bodyPr wrap="none" rtlCol="0">
-              <a:spAutoFit/>
-            </a:bodyPr>
-            <a:lstStyle/>
-            <a:p>
-              <a:pPr algn="r"/>
-              <a:r>
-                <a:rPr lang="en-US" sz="2000">
-                  <a:cs typeface="Arial Narrow" panose="020B0604020202020204" pitchFamily="34" charset="0"/>
-                </a:rPr>
-                <a:t>imaginaryPart</a:t>
-              </a:r>
-            </a:p>
-          </p:txBody>
-        </p:sp>
-        <p:cxnSp>
-          <p:nvCxnSpPr>
-            <p:cNvPr id="43" name="Straight Connector 42">
-              <a:extLst>
-                <a:ext uri="{FF2B5EF4-FFF2-40B4-BE49-F238E27FC236}">
-                  <a16:creationId xmlns:a16="http://schemas.microsoft.com/office/drawing/2014/main" id="{F8217097-C7BE-D14A-B7BC-8BB6D352EB13}"/>
-                </a:ext>
-              </a:extLst>
-            </p:cNvPr>
-            <p:cNvCxnSpPr>
-              <a:cxnSpLocks/>
-              <a:endCxn id="44" idx="1"/>
-            </p:cNvCxnSpPr>
-            <p:nvPr/>
-          </p:nvCxnSpPr>
-          <p:spPr>
-            <a:xfrm>
-              <a:off x="1799303" y="4426222"/>
-              <a:ext cx="1789388" cy="2"/>
-            </a:xfrm>
-            <a:prstGeom prst="line">
-              <a:avLst/>
-            </a:prstGeom>
-            <a:ln w="12700">
-              <a:solidFill>
-                <a:schemeClr val="tx1"/>
-              </a:solidFill>
-            </a:ln>
-          </p:spPr>
-          <p:style>
-            <a:lnRef idx="1">
-              <a:schemeClr val="accent1"/>
-            </a:lnRef>
-            <a:fillRef idx="0">
-              <a:schemeClr val="accent1"/>
-            </a:fillRef>
-            <a:effectRef idx="0">
-              <a:schemeClr val="accent1"/>
-            </a:effectRef>
-            <a:fontRef idx="minor">
-              <a:schemeClr val="tx1"/>
-            </a:fontRef>
-          </p:style>
-        </p:cxnSp>
-        <p:sp>
-          <p:nvSpPr>
-            <p:cNvPr id="44" name="Diamond 43">
-              <a:extLst>
-                <a:ext uri="{FF2B5EF4-FFF2-40B4-BE49-F238E27FC236}">
-                  <a16:creationId xmlns:a16="http://schemas.microsoft.com/office/drawing/2014/main" id="{00C18C0D-C5A0-094D-8381-BFB17B4A53AC}"/>
-                </a:ext>
-              </a:extLst>
-            </p:cNvPr>
-            <p:cNvSpPr/>
-            <p:nvPr/>
-          </p:nvSpPr>
-          <p:spPr>
-            <a:xfrm>
-              <a:off x="3588691" y="4365034"/>
-              <a:ext cx="184221" cy="122380"/>
-            </a:xfrm>
-            <a:prstGeom prst="diamond">
-              <a:avLst/>
-            </a:prstGeom>
+          </a:ln>
+        </p:spPr>
+        <p:style>
+          <a:lnRef idx="1">
+            <a:schemeClr val="accent1"/>
+          </a:lnRef>
+          <a:fillRef idx="0">
+            <a:schemeClr val="accent1"/>
+          </a:fillRef>
+          <a:effectRef idx="0">
+            <a:schemeClr val="accent1"/>
+          </a:effectRef>
+          <a:fontRef idx="minor">
+            <a:schemeClr val="tx1"/>
+          </a:fontRef>
+        </p:style>
+      </p:cxnSp>
+      <p:sp>
+        <p:nvSpPr>
+          <p:cNvPr id="39" name="Diamond 38">
+            <a:extLst>
+              <a:ext uri="{FF2B5EF4-FFF2-40B4-BE49-F238E27FC236}">
+                <a16:creationId xmlns:a16="http://schemas.microsoft.com/office/drawing/2014/main" id="{F21A8CD5-E993-4749-B2F7-9EEF30D0D8DF}"/>
+              </a:ext>
+            </a:extLst>
+          </p:cNvPr>
+          <p:cNvSpPr/>
+          <p:nvPr/>
+        </p:nvSpPr>
+        <p:spPr>
+          <a:xfrm>
+            <a:off x="3486972" y="4180371"/>
+            <a:ext cx="184221" cy="122380"/>
+          </a:xfrm>
+          <a:prstGeom prst="diamond">
+            <a:avLst/>
+          </a:prstGeom>
+          <a:solidFill>
+            <a:schemeClr val="tx1"/>
+          </a:solidFill>
+          <a:ln w="6350">
             <a:solidFill>
               <a:schemeClr val="tx1"/>
             </a:solidFill>
-            <a:ln w="6350">
-              <a:solidFill>
-                <a:schemeClr val="tx1"/>
-              </a:solidFill>
-            </a:ln>
-          </p:spPr>
-          <p:style>
-            <a:lnRef idx="2">
-              <a:schemeClr val="accent1">
-                <a:shade val="50000"/>
-              </a:schemeClr>
-            </a:lnRef>
-            <a:fillRef idx="1">
-              <a:schemeClr val="accent1"/>
-            </a:fillRef>
-            <a:effectRef idx="0">
-              <a:schemeClr val="accent1"/>
-            </a:effectRef>
-            <a:fontRef idx="minor">
-              <a:schemeClr val="lt1"/>
-            </a:fontRef>
-          </p:style>
-          <p:txBody>
-            <a:bodyPr rtlCol="0" anchor="ctr"/>
-            <a:lstStyle/>
-            <a:p>
-              <a:pPr algn="ctr"/>
-              <a:endParaRPr lang="en-US" sz="2000"/>
-            </a:p>
-          </p:txBody>
-        </p:sp>
-      </p:grpSp>
+          </a:ln>
+        </p:spPr>
+        <p:style>
+          <a:lnRef idx="2">
+            <a:schemeClr val="accent1">
+              <a:shade val="50000"/>
+            </a:schemeClr>
+          </a:lnRef>
+          <a:fillRef idx="1">
+            <a:schemeClr val="accent1"/>
+          </a:fillRef>
+          <a:effectRef idx="0">
+            <a:schemeClr val="accent1"/>
+          </a:effectRef>
+          <a:fontRef idx="minor">
+            <a:schemeClr val="lt1"/>
+          </a:fontRef>
+        </p:style>
+        <p:txBody>
+          <a:bodyPr rtlCol="0" anchor="ctr"/>
+          <a:lstStyle/>
+          <a:p>
+            <a:pPr algn="ctr"/>
+            <a:endParaRPr lang="en-US" sz="2000"/>
+          </a:p>
+        </p:txBody>
+      </p:sp>
+      <p:sp>
+        <p:nvSpPr>
+          <p:cNvPr id="40" name="TextBox 39">
+            <a:extLst>
+              <a:ext uri="{FF2B5EF4-FFF2-40B4-BE49-F238E27FC236}">
+                <a16:creationId xmlns:a16="http://schemas.microsoft.com/office/drawing/2014/main" id="{5E1E3B53-C08A-B141-8340-6EB7237D6CDA}"/>
+              </a:ext>
+            </a:extLst>
+          </p:cNvPr>
+          <p:cNvSpPr txBox="1"/>
+          <p:nvPr/>
+        </p:nvSpPr>
+        <p:spPr>
+          <a:xfrm>
+            <a:off x="2765860" y="3967295"/>
+            <a:ext cx="761939" cy="307777"/>
+          </a:xfrm>
+          <a:prstGeom prst="rect">
+            <a:avLst/>
+          </a:prstGeom>
+          <a:noFill/>
+        </p:spPr>
+        <p:txBody>
+          <a:bodyPr wrap="none" rtlCol="0">
+            <a:spAutoFit/>
+          </a:bodyPr>
+          <a:lstStyle/>
+          <a:p>
+            <a:pPr algn="r"/>
+            <a:r>
+              <a:rPr lang="en-US" sz="1400">
+                <a:cs typeface="Arial Narrow" panose="020B0604020202020204" pitchFamily="34" charset="0"/>
+              </a:rPr>
+              <a:t>realPart</a:t>
+            </a:r>
+          </a:p>
+        </p:txBody>
+      </p:sp>
+      <p:sp>
+        <p:nvSpPr>
+          <p:cNvPr id="41" name="TextBox 40">
+            <a:extLst>
+              <a:ext uri="{FF2B5EF4-FFF2-40B4-BE49-F238E27FC236}">
+                <a16:creationId xmlns:a16="http://schemas.microsoft.com/office/drawing/2014/main" id="{EF997AA4-D994-C34C-9FE8-CD23B7C4DD96}"/>
+              </a:ext>
+            </a:extLst>
+          </p:cNvPr>
+          <p:cNvSpPr txBox="1"/>
+          <p:nvPr/>
+        </p:nvSpPr>
+        <p:spPr>
+          <a:xfrm>
+            <a:off x="2320161" y="4377418"/>
+            <a:ext cx="1207638" cy="307777"/>
+          </a:xfrm>
+          <a:prstGeom prst="rect">
+            <a:avLst/>
+          </a:prstGeom>
+          <a:noFill/>
+        </p:spPr>
+        <p:txBody>
+          <a:bodyPr wrap="none" rtlCol="0">
+            <a:spAutoFit/>
+          </a:bodyPr>
+          <a:lstStyle/>
+          <a:p>
+            <a:pPr algn="r"/>
+            <a:r>
+              <a:rPr lang="en-US" sz="1400">
+                <a:cs typeface="Arial Narrow" panose="020B0604020202020204" pitchFamily="34" charset="0"/>
+              </a:rPr>
+              <a:t>imaginaryPart</a:t>
+            </a:r>
+          </a:p>
+        </p:txBody>
+      </p:sp>
+      <p:cxnSp>
+        <p:nvCxnSpPr>
+          <p:cNvPr id="43" name="Straight Connector 42">
+            <a:extLst>
+              <a:ext uri="{FF2B5EF4-FFF2-40B4-BE49-F238E27FC236}">
+                <a16:creationId xmlns:a16="http://schemas.microsoft.com/office/drawing/2014/main" id="{F8217097-C7BE-D14A-B7BC-8BB6D352EB13}"/>
+              </a:ext>
+            </a:extLst>
+          </p:cNvPr>
+          <p:cNvCxnSpPr>
+            <a:cxnSpLocks/>
+            <a:endCxn id="44" idx="1"/>
+          </p:cNvCxnSpPr>
+          <p:nvPr/>
+        </p:nvCxnSpPr>
+        <p:spPr>
+          <a:xfrm>
+            <a:off x="1697584" y="4426222"/>
+            <a:ext cx="1789388" cy="2"/>
+          </a:xfrm>
+          <a:prstGeom prst="line">
+            <a:avLst/>
+          </a:prstGeom>
+          <a:ln w="12700">
+            <a:solidFill>
+              <a:schemeClr val="tx1"/>
+            </a:solidFill>
+          </a:ln>
+        </p:spPr>
+        <p:style>
+          <a:lnRef idx="1">
+            <a:schemeClr val="accent1"/>
+          </a:lnRef>
+          <a:fillRef idx="0">
+            <a:schemeClr val="accent1"/>
+          </a:fillRef>
+          <a:effectRef idx="0">
+            <a:schemeClr val="accent1"/>
+          </a:effectRef>
+          <a:fontRef idx="minor">
+            <a:schemeClr val="tx1"/>
+          </a:fontRef>
+        </p:style>
+      </p:cxnSp>
+      <p:sp>
+        <p:nvSpPr>
+          <p:cNvPr id="44" name="Diamond 43">
+            <a:extLst>
+              <a:ext uri="{FF2B5EF4-FFF2-40B4-BE49-F238E27FC236}">
+                <a16:creationId xmlns:a16="http://schemas.microsoft.com/office/drawing/2014/main" id="{00C18C0D-C5A0-094D-8381-BFB17B4A53AC}"/>
+              </a:ext>
+            </a:extLst>
+          </p:cNvPr>
+          <p:cNvSpPr/>
+          <p:nvPr/>
+        </p:nvSpPr>
+        <p:spPr>
+          <a:xfrm>
+            <a:off x="3486972" y="4365034"/>
+            <a:ext cx="184221" cy="122380"/>
+          </a:xfrm>
+          <a:prstGeom prst="diamond">
+            <a:avLst/>
+          </a:prstGeom>
+          <a:solidFill>
+            <a:schemeClr val="tx1"/>
+          </a:solidFill>
+          <a:ln w="6350">
+            <a:solidFill>
+              <a:schemeClr val="tx1"/>
+            </a:solidFill>
+          </a:ln>
+        </p:spPr>
+        <p:style>
+          <a:lnRef idx="2">
+            <a:schemeClr val="accent1">
+              <a:shade val="50000"/>
+            </a:schemeClr>
+          </a:lnRef>
+          <a:fillRef idx="1">
+            <a:schemeClr val="accent1"/>
+          </a:fillRef>
+          <a:effectRef idx="0">
+            <a:schemeClr val="accent1"/>
+          </a:effectRef>
+          <a:fontRef idx="minor">
+            <a:schemeClr val="lt1"/>
+          </a:fontRef>
+        </p:style>
+        <p:txBody>
+          <a:bodyPr rtlCol="0" anchor="ctr"/>
+          <a:lstStyle/>
+          <a:p>
+            <a:pPr algn="ctr"/>
+            <a:endParaRPr lang="en-US" sz="2000"/>
+          </a:p>
+        </p:txBody>
+      </p:sp>
       <p:sp>
         <p:nvSpPr>
           <p:cNvPr id="45" name="Rectangle 44">
@@ -5639,8 +5517,8 @@
         </p:nvSpPr>
         <p:spPr>
           <a:xfrm>
-            <a:off x="3813291" y="4132271"/>
-            <a:ext cx="2188548" cy="400110"/>
+            <a:off x="3671193" y="4163049"/>
+            <a:ext cx="2140138" cy="338554"/>
           </a:xfrm>
           <a:prstGeom prst="rect">
             <a:avLst/>
@@ -5681,13 +5559,13 @@
           <a:p>
             <a:pPr algn="ctr"/>
             <a:r>
-              <a:rPr lang="en-US" sz="2000">
+              <a:rPr lang="en-US" sz="1600">
                 <a:solidFill>
                   <a:schemeClr val="tx1"/>
                 </a:solidFill>
                 <a:cs typeface="Arial Narrow" panose="020B0604020202020204" pitchFamily="34" charset="0"/>
               </a:rPr>
-              <a:t>∼ ComplexRational</a:t>
+              <a:t>∼ Acl2ComplexRational</a:t>
             </a:r>
           </a:p>
         </p:txBody>
@@ -5706,8 +5584,8 @@
         </p:nvSpPr>
         <p:spPr>
           <a:xfrm>
-            <a:off x="6617346" y="2888815"/>
-            <a:ext cx="1135312" cy="400110"/>
+            <a:off x="6237291" y="2919593"/>
+            <a:ext cx="1301061" cy="338554"/>
           </a:xfrm>
           <a:prstGeom prst="rect">
             <a:avLst/>
@@ -5748,13 +5626,13 @@
           <a:p>
             <a:pPr algn="ctr"/>
             <a:r>
-              <a:rPr lang="en-US" sz="2000">
+              <a:rPr lang="en-US" sz="1600">
                 <a:solidFill>
                   <a:schemeClr val="tx1"/>
                 </a:solidFill>
                 <a:cs typeface="Arial Narrow" panose="020B0604020202020204" pitchFamily="34" charset="0"/>
               </a:rPr>
-              <a:t>+ Symbol</a:t>
+              <a:t>+ Acl2Symbol</a:t>
             </a:r>
           </a:p>
         </p:txBody>
@@ -5776,8 +5654,8 @@
         </p:nvCxnSpPr>
         <p:spPr>
           <a:xfrm>
-            <a:off x="5053676" y="2494185"/>
-            <a:ext cx="1" cy="394630"/>
+            <a:off x="4756494" y="2494185"/>
+            <a:ext cx="1" cy="425408"/>
           </a:xfrm>
           <a:prstGeom prst="line">
             <a:avLst/>
@@ -5820,8 +5698,8 @@
         </p:nvCxnSpPr>
         <p:spPr>
           <a:xfrm>
-            <a:off x="7185002" y="2494185"/>
-            <a:ext cx="0" cy="394630"/>
+            <a:off x="6887820" y="2494185"/>
+            <a:ext cx="2" cy="425408"/>
           </a:xfrm>
           <a:prstGeom prst="line">
             <a:avLst/>
@@ -5861,8 +5739,8 @@
         </p:nvSpPr>
         <p:spPr>
           <a:xfrm>
-            <a:off x="4563799" y="2888815"/>
-            <a:ext cx="979755" cy="400110"/>
+            <a:off x="4168834" y="2919593"/>
+            <a:ext cx="1175322" cy="338554"/>
           </a:xfrm>
           <a:prstGeom prst="rect">
             <a:avLst/>
@@ -5903,13 +5781,13 @@
           <a:p>
             <a:pPr algn="ctr"/>
             <a:r>
-              <a:rPr lang="en-US" sz="2000">
+              <a:rPr lang="en-US" sz="1600">
                 <a:solidFill>
                   <a:schemeClr val="tx1"/>
                 </a:solidFill>
                 <a:cs typeface="Arial Narrow" panose="020B0604020202020204" pitchFamily="34" charset="0"/>
               </a:rPr>
-              <a:t>+ String</a:t>
+              <a:t>+ Acl2String</a:t>
             </a:r>
           </a:p>
         </p:txBody>
@@ -5931,8 +5809,8 @@
         </p:nvCxnSpPr>
         <p:spPr>
           <a:xfrm>
-            <a:off x="3735754" y="2484358"/>
-            <a:ext cx="0" cy="404457"/>
+            <a:off x="3285204" y="2484358"/>
+            <a:ext cx="0" cy="435235"/>
           </a:xfrm>
           <a:prstGeom prst="line">
             <a:avLst/>
@@ -5972,8 +5850,8 @@
         </p:nvSpPr>
         <p:spPr>
           <a:xfrm>
-            <a:off x="3043898" y="2888815"/>
-            <a:ext cx="1383712" cy="400110"/>
+            <a:off x="2536441" y="2919593"/>
+            <a:ext cx="1497526" cy="338554"/>
           </a:xfrm>
           <a:prstGeom prst="rect">
             <a:avLst/>
@@ -6014,13 +5892,13 @@
           <a:p>
             <a:pPr algn="ctr"/>
             <a:r>
-              <a:rPr lang="en-US" sz="2000">
+              <a:rPr lang="en-US" sz="1600">
                 <a:solidFill>
                   <a:schemeClr val="tx1"/>
                 </a:solidFill>
                 <a:cs typeface="Arial Narrow" panose="020B0604020202020204" pitchFamily="34" charset="0"/>
               </a:rPr>
-              <a:t>+ Character</a:t>
+              <a:t>+ Acl2Character</a:t>
             </a:r>
           </a:p>
         </p:txBody>
@@ -6039,8 +5917,8 @@
         </p:nvSpPr>
         <p:spPr>
           <a:xfrm>
-            <a:off x="6292894" y="4132271"/>
-            <a:ext cx="1834991" cy="400110"/>
+            <a:off x="5969645" y="4163049"/>
+            <a:ext cx="1856534" cy="338554"/>
           </a:xfrm>
           <a:prstGeom prst="rect">
             <a:avLst/>
@@ -6081,13 +5959,13 @@
           <a:p>
             <a:pPr algn="ctr"/>
             <a:r>
-              <a:rPr lang="en-US" sz="2000">
+              <a:rPr lang="en-US" sz="1600">
                 <a:solidFill>
                   <a:schemeClr val="tx1"/>
                 </a:solidFill>
                 <a:cs typeface="Arial Narrow" panose="020B0604020202020204" pitchFamily="34" charset="0"/>
               </a:rPr>
-              <a:t>+ PackageName</a:t>
+              <a:t>+ Acl2PackageName</a:t>
             </a:r>
           </a:p>
         </p:txBody>
@@ -6106,8 +5984,8 @@
         </p:nvSpPr>
         <p:spPr>
           <a:xfrm>
-            <a:off x="709560" y="4132271"/>
-            <a:ext cx="1229055" cy="400110"/>
+            <a:off x="557447" y="4163049"/>
+            <a:ext cx="1385315" cy="338554"/>
           </a:xfrm>
           <a:prstGeom prst="rect">
             <a:avLst/>
@@ -6148,7 +6026,7 @@
           <a:p>
             <a:pPr algn="ctr"/>
             <a:r>
-              <a:rPr lang="en-US" sz="2000">
+              <a:rPr lang="en-US" sz="1600">
                 <a:solidFill>
                   <a:schemeClr val="tx1"/>
                 </a:solidFill>
@@ -6157,112 +6035,91 @@
               <a:t>+ </a:t>
             </a:r>
             <a:r>
-              <a:rPr lang="en-US" sz="2000" i="1">
+              <a:rPr lang="en-US" sz="1600" i="1">
                 <a:solidFill>
                   <a:schemeClr val="tx1"/>
                 </a:solidFill>
                 <a:cs typeface="Arial Narrow" panose="020B0604020202020204" pitchFamily="34" charset="0"/>
               </a:rPr>
-              <a:t>Rational</a:t>
-            </a:r>
-          </a:p>
-        </p:txBody>
-      </p:sp>
-      <p:grpSp>
-        <p:nvGrpSpPr>
-          <p:cNvPr id="34" name="Group 33">
+              <a:t>Acl2Rational</a:t>
+            </a:r>
+          </a:p>
+        </p:txBody>
+      </p:sp>
+      <p:sp>
+        <p:nvSpPr>
+          <p:cNvPr id="84" name="TextBox 83">
             <a:extLst>
               <a:ext uri="{FF2B5EF4-FFF2-40B4-BE49-F238E27FC236}">
-                <a16:creationId xmlns:a16="http://schemas.microsoft.com/office/drawing/2014/main" id="{92406221-F7FC-854E-9127-2B8D821A40A7}"/>
+                <a16:creationId xmlns:a16="http://schemas.microsoft.com/office/drawing/2014/main" id="{EC10F051-CFC1-B546-AAEB-44B25A527FB6}"/>
               </a:ext>
             </a:extLst>
           </p:cNvPr>
-          <p:cNvGrpSpPr/>
+          <p:cNvSpPr txBox="1"/>
           <p:nvPr/>
-        </p:nvGrpSpPr>
-        <p:grpSpPr>
-          <a:xfrm>
-            <a:off x="5214508" y="1442206"/>
-            <a:ext cx="294647" cy="773742"/>
-            <a:chOff x="5230908" y="1438106"/>
-            <a:chExt cx="294647" cy="773742"/>
-          </a:xfrm>
-        </p:grpSpPr>
-        <p:sp>
-          <p:nvSpPr>
-            <p:cNvPr id="84" name="TextBox 83">
-              <a:extLst>
-                <a:ext uri="{FF2B5EF4-FFF2-40B4-BE49-F238E27FC236}">
-                  <a16:creationId xmlns:a16="http://schemas.microsoft.com/office/drawing/2014/main" id="{EC10F051-CFC1-B546-AAEB-44B25A527FB6}"/>
-                </a:ext>
-              </a:extLst>
-            </p:cNvPr>
-            <p:cNvSpPr txBox="1"/>
-            <p:nvPr/>
-          </p:nvSpPr>
-          <p:spPr>
-            <a:xfrm>
-              <a:off x="5230908" y="1438106"/>
-              <a:ext cx="288862" cy="338554"/>
-            </a:xfrm>
-            <a:prstGeom prst="rect">
-              <a:avLst/>
-            </a:prstGeom>
-            <a:noFill/>
-          </p:spPr>
-          <p:txBody>
-            <a:bodyPr wrap="none" rtlCol="0">
-              <a:spAutoFit/>
-            </a:bodyPr>
-            <a:lstStyle/>
-            <a:p>
-              <a:r>
-                <a:rPr lang="en-US" sz="1600">
-                  <a:cs typeface="Arial Narrow" panose="020B0604020202020204" pitchFamily="34" charset="0"/>
-                </a:rPr>
-                <a:t>1</a:t>
-              </a:r>
-            </a:p>
-          </p:txBody>
-        </p:sp>
-        <p:sp>
-          <p:nvSpPr>
-            <p:cNvPr id="85" name="TextBox 84">
-              <a:extLst>
-                <a:ext uri="{FF2B5EF4-FFF2-40B4-BE49-F238E27FC236}">
-                  <a16:creationId xmlns:a16="http://schemas.microsoft.com/office/drawing/2014/main" id="{5363A6D9-C604-5243-9255-BFE29C10F21D}"/>
-                </a:ext>
-              </a:extLst>
-            </p:cNvPr>
-            <p:cNvSpPr txBox="1"/>
-            <p:nvPr/>
-          </p:nvSpPr>
-          <p:spPr>
-            <a:xfrm>
-              <a:off x="5236693" y="1873294"/>
-              <a:ext cx="288862" cy="338554"/>
-            </a:xfrm>
-            <a:prstGeom prst="rect">
-              <a:avLst/>
-            </a:prstGeom>
-            <a:noFill/>
-          </p:spPr>
-          <p:txBody>
-            <a:bodyPr wrap="none" rtlCol="0">
-              <a:spAutoFit/>
-            </a:bodyPr>
-            <a:lstStyle/>
-            <a:p>
-              <a:r>
-                <a:rPr lang="en-US" sz="1600">
-                  <a:cs typeface="Arial Narrow" panose="020B0604020202020204" pitchFamily="34" charset="0"/>
-                </a:rPr>
-                <a:t>1</a:t>
-              </a:r>
-            </a:p>
-          </p:txBody>
-        </p:sp>
-      </p:grpSp>
+        </p:nvSpPr>
+        <p:spPr>
+          <a:xfrm>
+            <a:off x="5514841" y="1495506"/>
+            <a:ext cx="263214" cy="276999"/>
+          </a:xfrm>
+          <a:prstGeom prst="rect">
+            <a:avLst/>
+          </a:prstGeom>
+          <a:noFill/>
+        </p:spPr>
+        <p:txBody>
+          <a:bodyPr wrap="none" rtlCol="0">
+            <a:spAutoFit/>
+          </a:bodyPr>
+          <a:lstStyle/>
+          <a:p>
+            <a:r>
+              <a:rPr lang="en-US" sz="1200">
+                <a:cs typeface="Arial Narrow" panose="020B0604020202020204" pitchFamily="34" charset="0"/>
+              </a:rPr>
+              <a:t>1</a:t>
+            </a:r>
+          </a:p>
+        </p:txBody>
+      </p:sp>
+      <p:sp>
+        <p:nvSpPr>
+          <p:cNvPr id="85" name="TextBox 84">
+            <a:extLst>
+              <a:ext uri="{FF2B5EF4-FFF2-40B4-BE49-F238E27FC236}">
+                <a16:creationId xmlns:a16="http://schemas.microsoft.com/office/drawing/2014/main" id="{5363A6D9-C604-5243-9255-BFE29C10F21D}"/>
+              </a:ext>
+            </a:extLst>
+          </p:cNvPr>
+          <p:cNvSpPr txBox="1"/>
+          <p:nvPr/>
+        </p:nvSpPr>
+        <p:spPr>
+          <a:xfrm>
+            <a:off x="5520626" y="1877394"/>
+            <a:ext cx="263214" cy="276999"/>
+          </a:xfrm>
+          <a:prstGeom prst="rect">
+            <a:avLst/>
+          </a:prstGeom>
+          <a:noFill/>
+        </p:spPr>
+        <p:txBody>
+          <a:bodyPr wrap="none" rtlCol="0">
+            <a:spAutoFit/>
+          </a:bodyPr>
+          <a:lstStyle/>
+          <a:p>
+            <a:r>
+              <a:rPr lang="en-US" sz="1200">
+                <a:cs typeface="Arial Narrow" panose="020B0604020202020204" pitchFamily="34" charset="0"/>
+              </a:rPr>
+              <a:t>1</a:t>
+            </a:r>
+          </a:p>
+        </p:txBody>
+      </p:sp>
       <p:sp>
         <p:nvSpPr>
           <p:cNvPr id="86" name="TextBox 85">
@@ -6277,8 +6134,8 @@
         </p:nvSpPr>
         <p:spPr>
           <a:xfrm>
-            <a:off x="5521426" y="3046930"/>
-            <a:ext cx="288862" cy="338554"/>
+            <a:off x="5306065" y="3047815"/>
+            <a:ext cx="263214" cy="276999"/>
           </a:xfrm>
           <a:prstGeom prst="rect">
             <a:avLst/>
@@ -6292,7 +6149,7 @@
           <a:lstStyle/>
           <a:p>
             <a:r>
-              <a:rPr lang="en-US" sz="1600">
+              <a:rPr lang="en-US" sz="1200">
                 <a:cs typeface="Arial Narrow" panose="020B0604020202020204" pitchFamily="34" charset="0"/>
               </a:rPr>
               <a:t>1</a:t>
@@ -6300,196 +6157,80 @@
           </a:p>
         </p:txBody>
       </p:sp>
-      <p:grpSp>
-        <p:nvGrpSpPr>
-          <p:cNvPr id="91" name="Group 90">
+      <p:sp>
+        <p:nvSpPr>
+          <p:cNvPr id="95" name="TextBox 94">
             <a:extLst>
               <a:ext uri="{FF2B5EF4-FFF2-40B4-BE49-F238E27FC236}">
-                <a16:creationId xmlns:a16="http://schemas.microsoft.com/office/drawing/2014/main" id="{0C209190-6844-4043-9BD1-9920C78AFBB9}"/>
+                <a16:creationId xmlns:a16="http://schemas.microsoft.com/office/drawing/2014/main" id="{29897969-DD81-4C4C-8F1D-7DB858122879}"/>
               </a:ext>
             </a:extLst>
           </p:cNvPr>
-          <p:cNvGrpSpPr/>
+          <p:cNvSpPr txBox="1"/>
           <p:nvPr/>
-        </p:nvGrpSpPr>
-        <p:grpSpPr>
-          <a:xfrm>
-            <a:off x="1190429" y="5180891"/>
-            <a:ext cx="294647" cy="773742"/>
-            <a:chOff x="5230908" y="1438106"/>
-            <a:chExt cx="294647" cy="773742"/>
-          </a:xfrm>
-        </p:grpSpPr>
-        <p:sp>
-          <p:nvSpPr>
-            <p:cNvPr id="92" name="TextBox 91">
-              <a:extLst>
-                <a:ext uri="{FF2B5EF4-FFF2-40B4-BE49-F238E27FC236}">
-                  <a16:creationId xmlns:a16="http://schemas.microsoft.com/office/drawing/2014/main" id="{145898C1-F68B-CA4F-9BA9-A0D0BC864661}"/>
-                </a:ext>
-              </a:extLst>
-            </p:cNvPr>
-            <p:cNvSpPr txBox="1"/>
-            <p:nvPr/>
-          </p:nvSpPr>
-          <p:spPr>
-            <a:xfrm>
-              <a:off x="5230908" y="1438106"/>
-              <a:ext cx="288862" cy="338554"/>
-            </a:xfrm>
-            <a:prstGeom prst="rect">
-              <a:avLst/>
-            </a:prstGeom>
-            <a:noFill/>
-          </p:spPr>
-          <p:txBody>
-            <a:bodyPr wrap="none" rtlCol="0">
-              <a:spAutoFit/>
-            </a:bodyPr>
-            <a:lstStyle/>
-            <a:p>
-              <a:r>
-                <a:rPr lang="en-US" sz="1600">
-                  <a:cs typeface="Arial Narrow" panose="020B0604020202020204" pitchFamily="34" charset="0"/>
-                </a:rPr>
-                <a:t>1</a:t>
-              </a:r>
-            </a:p>
-          </p:txBody>
-        </p:sp>
-        <p:sp>
-          <p:nvSpPr>
-            <p:cNvPr id="93" name="TextBox 92">
-              <a:extLst>
-                <a:ext uri="{FF2B5EF4-FFF2-40B4-BE49-F238E27FC236}">
-                  <a16:creationId xmlns:a16="http://schemas.microsoft.com/office/drawing/2014/main" id="{A4C7A717-0B92-5547-BBEC-286D04EF422D}"/>
-                </a:ext>
-              </a:extLst>
-            </p:cNvPr>
-            <p:cNvSpPr txBox="1"/>
-            <p:nvPr/>
-          </p:nvSpPr>
-          <p:spPr>
-            <a:xfrm>
-              <a:off x="5236693" y="1873294"/>
-              <a:ext cx="288862" cy="338554"/>
-            </a:xfrm>
-            <a:prstGeom prst="rect">
-              <a:avLst/>
-            </a:prstGeom>
-            <a:noFill/>
-          </p:spPr>
-          <p:txBody>
-            <a:bodyPr wrap="none" rtlCol="0">
-              <a:spAutoFit/>
-            </a:bodyPr>
-            <a:lstStyle/>
-            <a:p>
-              <a:r>
-                <a:rPr lang="en-US" sz="1600">
-                  <a:cs typeface="Arial Narrow" panose="020B0604020202020204" pitchFamily="34" charset="0"/>
-                </a:rPr>
-                <a:t>1</a:t>
-              </a:r>
-            </a:p>
-          </p:txBody>
-        </p:sp>
-      </p:grpSp>
-      <p:grpSp>
-        <p:nvGrpSpPr>
-          <p:cNvPr id="94" name="Group 93">
+        </p:nvSpPr>
+        <p:spPr>
+          <a:xfrm>
+            <a:off x="1889981" y="4003477"/>
+            <a:ext cx="263214" cy="276999"/>
+          </a:xfrm>
+          <a:prstGeom prst="rect">
+            <a:avLst/>
+          </a:prstGeom>
+          <a:noFill/>
+        </p:spPr>
+        <p:txBody>
+          <a:bodyPr wrap="none" rtlCol="0">
+            <a:spAutoFit/>
+          </a:bodyPr>
+          <a:lstStyle/>
+          <a:p>
+            <a:r>
+              <a:rPr lang="en-US" sz="1200">
+                <a:cs typeface="Arial Narrow" panose="020B0604020202020204" pitchFamily="34" charset="0"/>
+              </a:rPr>
+              <a:t>1</a:t>
+            </a:r>
+          </a:p>
+        </p:txBody>
+      </p:sp>
+      <p:sp>
+        <p:nvSpPr>
+          <p:cNvPr id="96" name="TextBox 95">
             <a:extLst>
               <a:ext uri="{FF2B5EF4-FFF2-40B4-BE49-F238E27FC236}">
-                <a16:creationId xmlns:a16="http://schemas.microsoft.com/office/drawing/2014/main" id="{0C11CE76-5D96-284F-9DED-B0111C989EA3}"/>
+                <a16:creationId xmlns:a16="http://schemas.microsoft.com/office/drawing/2014/main" id="{4B315217-FE93-3544-BE40-7970E29C1ECA}"/>
               </a:ext>
             </a:extLst>
           </p:cNvPr>
-          <p:cNvGrpSpPr/>
+          <p:cNvSpPr txBox="1"/>
           <p:nvPr/>
-        </p:nvGrpSpPr>
-        <p:grpSpPr>
-          <a:xfrm>
-            <a:off x="1889981" y="3954126"/>
-            <a:ext cx="294647" cy="773742"/>
-            <a:chOff x="5230908" y="1438106"/>
-            <a:chExt cx="294647" cy="773742"/>
-          </a:xfrm>
-        </p:grpSpPr>
-        <p:sp>
-          <p:nvSpPr>
-            <p:cNvPr id="95" name="TextBox 94">
-              <a:extLst>
-                <a:ext uri="{FF2B5EF4-FFF2-40B4-BE49-F238E27FC236}">
-                  <a16:creationId xmlns:a16="http://schemas.microsoft.com/office/drawing/2014/main" id="{29897969-DD81-4C4C-8F1D-7DB858122879}"/>
-                </a:ext>
-              </a:extLst>
-            </p:cNvPr>
-            <p:cNvSpPr txBox="1"/>
-            <p:nvPr/>
-          </p:nvSpPr>
-          <p:spPr>
-            <a:xfrm>
-              <a:off x="5230908" y="1438106"/>
-              <a:ext cx="288862" cy="338554"/>
-            </a:xfrm>
-            <a:prstGeom prst="rect">
-              <a:avLst/>
-            </a:prstGeom>
-            <a:noFill/>
-          </p:spPr>
-          <p:txBody>
-            <a:bodyPr wrap="none" rtlCol="0">
-              <a:spAutoFit/>
-            </a:bodyPr>
-            <a:lstStyle/>
-            <a:p>
-              <a:r>
-                <a:rPr lang="en-US" sz="1600">
-                  <a:cs typeface="Arial Narrow" panose="020B0604020202020204" pitchFamily="34" charset="0"/>
-                </a:rPr>
-                <a:t>1</a:t>
-              </a:r>
-            </a:p>
-          </p:txBody>
-        </p:sp>
-        <p:sp>
-          <p:nvSpPr>
-            <p:cNvPr id="96" name="TextBox 95">
-              <a:extLst>
-                <a:ext uri="{FF2B5EF4-FFF2-40B4-BE49-F238E27FC236}">
-                  <a16:creationId xmlns:a16="http://schemas.microsoft.com/office/drawing/2014/main" id="{4B315217-FE93-3544-BE40-7970E29C1ECA}"/>
-                </a:ext>
-              </a:extLst>
-            </p:cNvPr>
-            <p:cNvSpPr txBox="1"/>
-            <p:nvPr/>
-          </p:nvSpPr>
-          <p:spPr>
-            <a:xfrm>
-              <a:off x="5236693" y="1873294"/>
-              <a:ext cx="288862" cy="338554"/>
-            </a:xfrm>
-            <a:prstGeom prst="rect">
-              <a:avLst/>
-            </a:prstGeom>
-            <a:noFill/>
-          </p:spPr>
-          <p:txBody>
-            <a:bodyPr wrap="none" rtlCol="0">
-              <a:spAutoFit/>
-            </a:bodyPr>
-            <a:lstStyle/>
-            <a:p>
-              <a:r>
-                <a:rPr lang="en-US" sz="1600">
-                  <a:cs typeface="Arial Narrow" panose="020B0604020202020204" pitchFamily="34" charset="0"/>
-                </a:rPr>
-                <a:t>1</a:t>
-              </a:r>
-            </a:p>
-          </p:txBody>
-        </p:sp>
-      </p:grpSp>
+        </p:nvSpPr>
+        <p:spPr>
+          <a:xfrm>
+            <a:off x="1895766" y="4389314"/>
+            <a:ext cx="263214" cy="276999"/>
+          </a:xfrm>
+          <a:prstGeom prst="rect">
+            <a:avLst/>
+          </a:prstGeom>
+          <a:noFill/>
+        </p:spPr>
+        <p:txBody>
+          <a:bodyPr wrap="none" rtlCol="0">
+            <a:spAutoFit/>
+          </a:bodyPr>
+          <a:lstStyle/>
+          <a:p>
+            <a:r>
+              <a:rPr lang="en-US" sz="1200">
+                <a:cs typeface="Arial Narrow" panose="020B0604020202020204" pitchFamily="34" charset="0"/>
+              </a:rPr>
+              <a:t>1</a:t>
+            </a:r>
+          </a:p>
+        </p:txBody>
+      </p:sp>
       <p:sp>
         <p:nvSpPr>
           <p:cNvPr id="97" name="TextBox 96">
@@ -6504,8 +6245,8 @@
         </p:nvSpPr>
         <p:spPr>
           <a:xfrm>
-            <a:off x="6972985" y="3834217"/>
-            <a:ext cx="288862" cy="338554"/>
+            <a:off x="6695889" y="3924792"/>
+            <a:ext cx="263214" cy="276999"/>
           </a:xfrm>
           <a:prstGeom prst="rect">
             <a:avLst/>
@@ -6519,7 +6260,7 @@
           <a:lstStyle/>
           <a:p>
             <a:r>
-              <a:rPr lang="en-US" sz="1600">
+              <a:rPr lang="en-US" sz="1200">
                 <a:cs typeface="Arial Narrow" panose="020B0604020202020204" pitchFamily="34" charset="0"/>
               </a:rPr>
               <a:t>1</a:t>
@@ -6584,6 +6325,80 @@
               </a:solidFill>
               <a:cs typeface="Arial Narrow" panose="020B0604020202020204" pitchFamily="34" charset="0"/>
             </a:endParaRPr>
+          </a:p>
+        </p:txBody>
+      </p:sp>
+      <p:sp>
+        <p:nvSpPr>
+          <p:cNvPr id="99" name="TextBox 98">
+            <a:extLst>
+              <a:ext uri="{FF2B5EF4-FFF2-40B4-BE49-F238E27FC236}">
+                <a16:creationId xmlns:a16="http://schemas.microsoft.com/office/drawing/2014/main" id="{9101F8A4-19B8-654B-976A-23317DED8AB2}"/>
+              </a:ext>
+            </a:extLst>
+          </p:cNvPr>
+          <p:cNvSpPr txBox="1"/>
+          <p:nvPr/>
+        </p:nvSpPr>
+        <p:spPr>
+          <a:xfrm>
+            <a:off x="1288099" y="5235891"/>
+            <a:ext cx="263214" cy="276999"/>
+          </a:xfrm>
+          <a:prstGeom prst="rect">
+            <a:avLst/>
+          </a:prstGeom>
+          <a:noFill/>
+        </p:spPr>
+        <p:txBody>
+          <a:bodyPr wrap="none" rtlCol="0">
+            <a:spAutoFit/>
+          </a:bodyPr>
+          <a:lstStyle/>
+          <a:p>
+            <a:r>
+              <a:rPr lang="en-US" sz="1200">
+                <a:cs typeface="Arial Narrow" panose="020B0604020202020204" pitchFamily="34" charset="0"/>
+              </a:rPr>
+              <a:t>1</a:t>
+            </a:r>
+          </a:p>
+        </p:txBody>
+      </p:sp>
+      <p:sp>
+        <p:nvSpPr>
+          <p:cNvPr id="100" name="TextBox 99">
+            <a:extLst>
+              <a:ext uri="{FF2B5EF4-FFF2-40B4-BE49-F238E27FC236}">
+                <a16:creationId xmlns:a16="http://schemas.microsoft.com/office/drawing/2014/main" id="{3C22149A-23FB-DB4B-AC22-D0B0AA8E3175}"/>
+              </a:ext>
+            </a:extLst>
+          </p:cNvPr>
+          <p:cNvSpPr txBox="1"/>
+          <p:nvPr/>
+        </p:nvSpPr>
+        <p:spPr>
+          <a:xfrm>
+            <a:off x="1293884" y="5617779"/>
+            <a:ext cx="263214" cy="276999"/>
+          </a:xfrm>
+          <a:prstGeom prst="rect">
+            <a:avLst/>
+          </a:prstGeom>
+          <a:noFill/>
+        </p:spPr>
+        <p:txBody>
+          <a:bodyPr wrap="none" rtlCol="0">
+            <a:spAutoFit/>
+          </a:bodyPr>
+          <a:lstStyle/>
+          <a:p>
+            <a:r>
+              <a:rPr lang="en-US" sz="1200">
+                <a:cs typeface="Arial Narrow" panose="020B0604020202020204" pitchFamily="34" charset="0"/>
+              </a:rPr>
+              <a:t>1</a:t>
+            </a:r>
           </a:p>
         </p:txBody>
       </p:sp>

</xml_diff>

<commit_message>
[Java] Tweak ATJ tutorial pictures.
</commit_message>
<xml_diff>
--- a/books/kestrel/java/atj/images/value-classes.pptx
+++ b/books/kestrel/java/atj/images/value-classes.pptx
@@ -213,7 +213,7 @@
           </a:lstStyle>
           <a:p>
             <a:fld id="{FBA984DD-C9F9-3049-8A3A-E9E0DCCCEBB1}" type="datetimeFigureOut">
-              <a:t>2/4/20</a:t>
+              <a:t>2/5/20</a:t>
             </a:fld>
             <a:endParaRPr lang="en-US"/>
           </a:p>
@@ -607,7 +607,7 @@
           <a:lstStyle/>
           <a:p>
             <a:fld id="{B6976737-B4AE-8046-B287-15D2357F1C0B}" type="datetimeFigureOut">
-              <a:t>2/4/20</a:t>
+              <a:t>2/5/20</a:t>
             </a:fld>
             <a:endParaRPr lang="en-US"/>
           </a:p>
@@ -773,7 +773,7 @@
           <a:lstStyle/>
           <a:p>
             <a:fld id="{B6976737-B4AE-8046-B287-15D2357F1C0B}" type="datetimeFigureOut">
-              <a:t>2/4/20</a:t>
+              <a:t>2/5/20</a:t>
             </a:fld>
             <a:endParaRPr lang="en-US"/>
           </a:p>
@@ -949,7 +949,7 @@
           <a:lstStyle/>
           <a:p>
             <a:fld id="{B6976737-B4AE-8046-B287-15D2357F1C0B}" type="datetimeFigureOut">
-              <a:t>2/4/20</a:t>
+              <a:t>2/5/20</a:t>
             </a:fld>
             <a:endParaRPr lang="en-US"/>
           </a:p>
@@ -1115,7 +1115,7 @@
           <a:lstStyle/>
           <a:p>
             <a:fld id="{B6976737-B4AE-8046-B287-15D2357F1C0B}" type="datetimeFigureOut">
-              <a:t>2/4/20</a:t>
+              <a:t>2/5/20</a:t>
             </a:fld>
             <a:endParaRPr lang="en-US"/>
           </a:p>
@@ -1356,7 +1356,7 @@
           <a:lstStyle/>
           <a:p>
             <a:fld id="{B6976737-B4AE-8046-B287-15D2357F1C0B}" type="datetimeFigureOut">
-              <a:t>2/4/20</a:t>
+              <a:t>2/5/20</a:t>
             </a:fld>
             <a:endParaRPr lang="en-US"/>
           </a:p>
@@ -1583,7 +1583,7 @@
           <a:lstStyle/>
           <a:p>
             <a:fld id="{B6976737-B4AE-8046-B287-15D2357F1C0B}" type="datetimeFigureOut">
-              <a:t>2/4/20</a:t>
+              <a:t>2/5/20</a:t>
             </a:fld>
             <a:endParaRPr lang="en-US"/>
           </a:p>
@@ -1945,7 +1945,7 @@
           <a:lstStyle/>
           <a:p>
             <a:fld id="{B6976737-B4AE-8046-B287-15D2357F1C0B}" type="datetimeFigureOut">
-              <a:t>2/4/20</a:t>
+              <a:t>2/5/20</a:t>
             </a:fld>
             <a:endParaRPr lang="en-US"/>
           </a:p>
@@ -2060,7 +2060,7 @@
           <a:lstStyle/>
           <a:p>
             <a:fld id="{B6976737-B4AE-8046-B287-15D2357F1C0B}" type="datetimeFigureOut">
-              <a:t>2/4/20</a:t>
+              <a:t>2/5/20</a:t>
             </a:fld>
             <a:endParaRPr lang="en-US"/>
           </a:p>
@@ -2153,7 +2153,7 @@
           <a:lstStyle/>
           <a:p>
             <a:fld id="{B6976737-B4AE-8046-B287-15D2357F1C0B}" type="datetimeFigureOut">
-              <a:t>2/4/20</a:t>
+              <a:t>2/5/20</a:t>
             </a:fld>
             <a:endParaRPr lang="en-US"/>
           </a:p>
@@ -2426,7 +2426,7 @@
           <a:lstStyle/>
           <a:p>
             <a:fld id="{B6976737-B4AE-8046-B287-15D2357F1C0B}" type="datetimeFigureOut">
-              <a:t>2/4/20</a:t>
+              <a:t>2/5/20</a:t>
             </a:fld>
             <a:endParaRPr lang="en-US"/>
           </a:p>
@@ -2679,7 +2679,7 @@
           <a:lstStyle/>
           <a:p>
             <a:fld id="{B6976737-B4AE-8046-B287-15D2357F1C0B}" type="datetimeFigureOut">
-              <a:t>2/4/20</a:t>
+              <a:t>2/5/20</a:t>
             </a:fld>
             <a:endParaRPr lang="en-US"/>
           </a:p>
@@ -2888,7 +2888,7 @@
           </a:lstStyle>
           <a:p>
             <a:fld id="{B6976737-B4AE-8046-B287-15D2357F1C0B}" type="datetimeFigureOut">
-              <a:t>2/4/20</a:t>
+              <a:t>2/5/20</a:t>
             </a:fld>
             <a:endParaRPr lang="en-US"/>
           </a:p>
@@ -6314,7 +6314,7 @@
         </p:style>
         <p:txBody>
           <a:bodyPr wrap="square" rtlCol="0" anchor="ctr">
-            <a:spAutoFit/>
+            <a:noAutofit/>
           </a:bodyPr>
           <a:lstStyle/>
           <a:p>

</xml_diff>